<commit_message>
Open file with default app solution add
</commit_message>
<xml_diff>
--- a/Resource/icon_project.pptx
+++ b/Resource/icon_project.pptx
@@ -104,6 +104,11 @@
       </a:defRPr>
     </a:lvl9pPr>
   </p:defaultTextStyle>
+  <p:extLst>
+    <p:ext uri="{EFAFB233-063F-42B5-8137-9DF3F51BA10A}">
+      <p15:sldGuideLst xmlns:p15="http://schemas.microsoft.com/office/powerpoint/2012/main"/>
+    </p:ext>
+  </p:extLst>
 </p:presentation>
 </file>
 
@@ -238,7 +243,7 @@
           <a:p>
             <a:fld id="{430D1825-ADB5-4B23-B937-FDEB78A4A206}" type="datetimeFigureOut">
               <a:rPr lang="pl-PL" smtClean="0"/>
-              <a:t>15.07.2018</a:t>
+              <a:t>31.07.2018</a:t>
             </a:fld>
             <a:endParaRPr lang="pl-PL"/>
           </a:p>
@@ -408,7 +413,7 @@
           <a:p>
             <a:fld id="{430D1825-ADB5-4B23-B937-FDEB78A4A206}" type="datetimeFigureOut">
               <a:rPr lang="pl-PL" smtClean="0"/>
-              <a:t>15.07.2018</a:t>
+              <a:t>31.07.2018</a:t>
             </a:fld>
             <a:endParaRPr lang="pl-PL"/>
           </a:p>
@@ -588,7 +593,7 @@
           <a:p>
             <a:fld id="{430D1825-ADB5-4B23-B937-FDEB78A4A206}" type="datetimeFigureOut">
               <a:rPr lang="pl-PL" smtClean="0"/>
-              <a:t>15.07.2018</a:t>
+              <a:t>31.07.2018</a:t>
             </a:fld>
             <a:endParaRPr lang="pl-PL"/>
           </a:p>
@@ -758,7 +763,7 @@
           <a:p>
             <a:fld id="{430D1825-ADB5-4B23-B937-FDEB78A4A206}" type="datetimeFigureOut">
               <a:rPr lang="pl-PL" smtClean="0"/>
-              <a:t>15.07.2018</a:t>
+              <a:t>31.07.2018</a:t>
             </a:fld>
             <a:endParaRPr lang="pl-PL"/>
           </a:p>
@@ -1004,7 +1009,7 @@
           <a:p>
             <a:fld id="{430D1825-ADB5-4B23-B937-FDEB78A4A206}" type="datetimeFigureOut">
               <a:rPr lang="pl-PL" smtClean="0"/>
-              <a:t>15.07.2018</a:t>
+              <a:t>31.07.2018</a:t>
             </a:fld>
             <a:endParaRPr lang="pl-PL"/>
           </a:p>
@@ -1236,7 +1241,7 @@
           <a:p>
             <a:fld id="{430D1825-ADB5-4B23-B937-FDEB78A4A206}" type="datetimeFigureOut">
               <a:rPr lang="pl-PL" smtClean="0"/>
-              <a:t>15.07.2018</a:t>
+              <a:t>31.07.2018</a:t>
             </a:fld>
             <a:endParaRPr lang="pl-PL"/>
           </a:p>
@@ -1603,7 +1608,7 @@
           <a:p>
             <a:fld id="{430D1825-ADB5-4B23-B937-FDEB78A4A206}" type="datetimeFigureOut">
               <a:rPr lang="pl-PL" smtClean="0"/>
-              <a:t>15.07.2018</a:t>
+              <a:t>31.07.2018</a:t>
             </a:fld>
             <a:endParaRPr lang="pl-PL"/>
           </a:p>
@@ -1721,7 +1726,7 @@
           <a:p>
             <a:fld id="{430D1825-ADB5-4B23-B937-FDEB78A4A206}" type="datetimeFigureOut">
               <a:rPr lang="pl-PL" smtClean="0"/>
-              <a:t>15.07.2018</a:t>
+              <a:t>31.07.2018</a:t>
             </a:fld>
             <a:endParaRPr lang="pl-PL"/>
           </a:p>
@@ -1816,7 +1821,7 @@
           <a:p>
             <a:fld id="{430D1825-ADB5-4B23-B937-FDEB78A4A206}" type="datetimeFigureOut">
               <a:rPr lang="pl-PL" smtClean="0"/>
-              <a:t>15.07.2018</a:t>
+              <a:t>31.07.2018</a:t>
             </a:fld>
             <a:endParaRPr lang="pl-PL"/>
           </a:p>
@@ -2093,7 +2098,7 @@
           <a:p>
             <a:fld id="{430D1825-ADB5-4B23-B937-FDEB78A4A206}" type="datetimeFigureOut">
               <a:rPr lang="pl-PL" smtClean="0"/>
-              <a:t>15.07.2018</a:t>
+              <a:t>31.07.2018</a:t>
             </a:fld>
             <a:endParaRPr lang="pl-PL"/>
           </a:p>
@@ -2346,7 +2351,7 @@
           <a:p>
             <a:fld id="{430D1825-ADB5-4B23-B937-FDEB78A4A206}" type="datetimeFigureOut">
               <a:rPr lang="pl-PL" smtClean="0"/>
-              <a:t>15.07.2018</a:t>
+              <a:t>31.07.2018</a:t>
             </a:fld>
             <a:endParaRPr lang="pl-PL"/>
           </a:p>
@@ -2559,7 +2564,7 @@
           <a:p>
             <a:fld id="{430D1825-ADB5-4B23-B937-FDEB78A4A206}" type="datetimeFigureOut">
               <a:rPr lang="pl-PL" smtClean="0"/>
-              <a:t>15.07.2018</a:t>
+              <a:t>31.07.2018</a:t>
             </a:fld>
             <a:endParaRPr lang="pl-PL"/>
           </a:p>
@@ -2966,20 +2971,66 @@
       </p:grpSpPr>
       <p:sp>
         <p:nvSpPr>
+          <p:cNvPr id="2" name="Prostokąt zaokrąglony 1"/>
+          <p:cNvSpPr/>
+          <p:nvPr/>
+        </p:nvSpPr>
+        <p:spPr>
+          <a:xfrm>
+            <a:off x="5410199" y="821033"/>
+            <a:ext cx="1800583" cy="584775"/>
+          </a:xfrm>
+          <a:prstGeom prst="roundRect">
+            <a:avLst/>
+          </a:prstGeom>
+          <a:solidFill>
+            <a:srgbClr val="E0E0E0">
+              <a:alpha val="49804"/>
+            </a:srgbClr>
+          </a:solidFill>
+          <a:ln>
+            <a:noFill/>
+          </a:ln>
+        </p:spPr>
+        <p:style>
+          <a:lnRef idx="0">
+            <a:scrgbClr r="0" g="0" b="0"/>
+          </a:lnRef>
+          <a:fillRef idx="0">
+            <a:scrgbClr r="0" g="0" b="0"/>
+          </a:fillRef>
+          <a:effectRef idx="0">
+            <a:scrgbClr r="0" g="0" b="0"/>
+          </a:effectRef>
+          <a:fontRef idx="minor">
+            <a:schemeClr val="lt1"/>
+          </a:fontRef>
+        </p:style>
+        <p:txBody>
+          <a:bodyPr rtlCol="0" anchor="ctr"/>
+          <a:lstStyle/>
+          <a:p>
+            <a:pPr algn="ctr"/>
+            <a:endParaRPr lang="pl-PL"/>
+          </a:p>
+        </p:txBody>
+      </p:sp>
+      <p:sp>
+        <p:nvSpPr>
           <p:cNvPr id="4" name="Prostokąt zaokrąglony 3"/>
           <p:cNvSpPr/>
           <p:nvPr/>
         </p:nvSpPr>
         <p:spPr>
           <a:xfrm>
-            <a:off x="5430439" y="1830387"/>
+            <a:off x="3106339" y="2687637"/>
             <a:ext cx="612000" cy="612000"/>
           </a:xfrm>
           <a:prstGeom prst="roundRect">
             <a:avLst/>
           </a:prstGeom>
           <a:solidFill>
-            <a:srgbClr val="FFFF00"/>
+            <a:srgbClr val="E0E0E0"/>
           </a:solidFill>
           <a:ln>
             <a:noFill/>
@@ -3018,7 +3069,7 @@
         </p:nvSpPr>
         <p:spPr>
           <a:xfrm>
-            <a:off x="5524501" y="1928813"/>
+            <a:off x="3200401" y="2786063"/>
             <a:ext cx="421481" cy="423862"/>
           </a:xfrm>
           <a:prstGeom prst="arc">
@@ -3064,7 +3115,7 @@
         </p:nvSpPr>
         <p:spPr>
           <a:xfrm>
-            <a:off x="5821083" y="1928720"/>
+            <a:off x="3496983" y="2785970"/>
             <a:ext cx="128349" cy="138303"/>
           </a:xfrm>
           <a:prstGeom prst="rtTriangle">
@@ -3110,7 +3161,7 @@
         </p:nvSpPr>
         <p:spPr>
           <a:xfrm>
-            <a:off x="5656644" y="2045493"/>
+            <a:off x="3332544" y="2902743"/>
             <a:ext cx="161954" cy="171450"/>
           </a:xfrm>
           <a:prstGeom prst="downArrow">
@@ -3156,7 +3207,7 @@
         </p:nvSpPr>
         <p:spPr>
           <a:xfrm>
-            <a:off x="5644874" y="2219429"/>
+            <a:off x="3320774" y="3076679"/>
             <a:ext cx="180734" cy="31227"/>
           </a:xfrm>
           <a:prstGeom prst="rect">
@@ -3441,6 +3492,13 @@
   <p:clrMapOvr>
     <a:masterClrMapping/>
   </p:clrMapOvr>
+  <p:timing>
+    <p:tnLst>
+      <p:par>
+        <p:cTn id="1" dur="indefinite" restart="never" nodeType="tmRoot"/>
+      </p:par>
+    </p:tnLst>
+  </p:timing>
 </p:sld>
 </file>
 

</xml_diff>

<commit_message>
BeginInvokeOnMainThread add and splash screen and icon update
</commit_message>
<xml_diff>
--- a/Resource/icon_project.pptx
+++ b/Resource/icon_project.pptx
@@ -2,18 +2,18 @@
 <file path=ppt/presentation.xml><?xml version="1.0" encoding="utf-8"?>
 <p:presentation xmlns:a="http://schemas.openxmlformats.org/drawingml/2006/main" xmlns:r="http://schemas.openxmlformats.org/officeDocument/2006/relationships" xmlns:p="http://schemas.openxmlformats.org/presentationml/2006/main" saveSubsetFonts="1">
   <p:sldMasterIdLst>
-    <p:sldMasterId id="2147483648" r:id="rId1"/>
+    <p:sldMasterId id="2147483684" r:id="rId1"/>
   </p:sldMasterIdLst>
   <p:sldIdLst>
     <p:sldId id="256" r:id="rId2"/>
   </p:sldIdLst>
-  <p:sldSz cx="12192000" cy="6858000"/>
+  <p:sldSz cx="5543550" cy="3600450"/>
   <p:notesSz cx="6858000" cy="9144000"/>
   <p:defaultTextStyle>
     <a:defPPr>
-      <a:defRPr lang="pl-PL"/>
+      <a:defRPr lang="en-US"/>
     </a:defPPr>
-    <a:lvl1pPr marL="0" algn="l" defTabSz="914400" rtl="0" eaLnBrk="1" latinLnBrk="0" hangingPunct="1">
+    <a:lvl1pPr marL="0" algn="l" defTabSz="457200" rtl="0" eaLnBrk="1" latinLnBrk="0" hangingPunct="1">
       <a:defRPr sz="1800" kern="1200">
         <a:solidFill>
           <a:schemeClr val="tx1"/>
@@ -23,7 +23,7 @@
         <a:cs typeface="+mn-cs"/>
       </a:defRPr>
     </a:lvl1pPr>
-    <a:lvl2pPr marL="457200" algn="l" defTabSz="914400" rtl="0" eaLnBrk="1" latinLnBrk="0" hangingPunct="1">
+    <a:lvl2pPr marL="457200" algn="l" defTabSz="457200" rtl="0" eaLnBrk="1" latinLnBrk="0" hangingPunct="1">
       <a:defRPr sz="1800" kern="1200">
         <a:solidFill>
           <a:schemeClr val="tx1"/>
@@ -33,7 +33,7 @@
         <a:cs typeface="+mn-cs"/>
       </a:defRPr>
     </a:lvl2pPr>
-    <a:lvl3pPr marL="914400" algn="l" defTabSz="914400" rtl="0" eaLnBrk="1" latinLnBrk="0" hangingPunct="1">
+    <a:lvl3pPr marL="914400" algn="l" defTabSz="457200" rtl="0" eaLnBrk="1" latinLnBrk="0" hangingPunct="1">
       <a:defRPr sz="1800" kern="1200">
         <a:solidFill>
           <a:schemeClr val="tx1"/>
@@ -43,7 +43,7 @@
         <a:cs typeface="+mn-cs"/>
       </a:defRPr>
     </a:lvl3pPr>
-    <a:lvl4pPr marL="1371600" algn="l" defTabSz="914400" rtl="0" eaLnBrk="1" latinLnBrk="0" hangingPunct="1">
+    <a:lvl4pPr marL="1371600" algn="l" defTabSz="457200" rtl="0" eaLnBrk="1" latinLnBrk="0" hangingPunct="1">
       <a:defRPr sz="1800" kern="1200">
         <a:solidFill>
           <a:schemeClr val="tx1"/>
@@ -53,7 +53,7 @@
         <a:cs typeface="+mn-cs"/>
       </a:defRPr>
     </a:lvl4pPr>
-    <a:lvl5pPr marL="1828800" algn="l" defTabSz="914400" rtl="0" eaLnBrk="1" latinLnBrk="0" hangingPunct="1">
+    <a:lvl5pPr marL="1828800" algn="l" defTabSz="457200" rtl="0" eaLnBrk="1" latinLnBrk="0" hangingPunct="1">
       <a:defRPr sz="1800" kern="1200">
         <a:solidFill>
           <a:schemeClr val="tx1"/>
@@ -63,7 +63,7 @@
         <a:cs typeface="+mn-cs"/>
       </a:defRPr>
     </a:lvl5pPr>
-    <a:lvl6pPr marL="2286000" algn="l" defTabSz="914400" rtl="0" eaLnBrk="1" latinLnBrk="0" hangingPunct="1">
+    <a:lvl6pPr marL="2286000" algn="l" defTabSz="457200" rtl="0" eaLnBrk="1" latinLnBrk="0" hangingPunct="1">
       <a:defRPr sz="1800" kern="1200">
         <a:solidFill>
           <a:schemeClr val="tx1"/>
@@ -73,7 +73,7 @@
         <a:cs typeface="+mn-cs"/>
       </a:defRPr>
     </a:lvl6pPr>
-    <a:lvl7pPr marL="2743200" algn="l" defTabSz="914400" rtl="0" eaLnBrk="1" latinLnBrk="0" hangingPunct="1">
+    <a:lvl7pPr marL="2743200" algn="l" defTabSz="457200" rtl="0" eaLnBrk="1" latinLnBrk="0" hangingPunct="1">
       <a:defRPr sz="1800" kern="1200">
         <a:solidFill>
           <a:schemeClr val="tx1"/>
@@ -83,7 +83,7 @@
         <a:cs typeface="+mn-cs"/>
       </a:defRPr>
     </a:lvl7pPr>
-    <a:lvl8pPr marL="3200400" algn="l" defTabSz="914400" rtl="0" eaLnBrk="1" latinLnBrk="0" hangingPunct="1">
+    <a:lvl8pPr marL="3200400" algn="l" defTabSz="457200" rtl="0" eaLnBrk="1" latinLnBrk="0" hangingPunct="1">
       <a:defRPr sz="1800" kern="1200">
         <a:solidFill>
           <a:schemeClr val="tx1"/>
@@ -93,7 +93,7 @@
         <a:cs typeface="+mn-cs"/>
       </a:defRPr>
     </a:lvl8pPr>
-    <a:lvl9pPr marL="3657600" algn="l" defTabSz="914400" rtl="0" eaLnBrk="1" latinLnBrk="0" hangingPunct="1">
+    <a:lvl9pPr marL="3657600" algn="l" defTabSz="457200" rtl="0" eaLnBrk="1" latinLnBrk="0" hangingPunct="1">
       <a:defRPr sz="1800" kern="1200">
         <a:solidFill>
           <a:schemeClr val="tx1"/>
@@ -131,7 +131,7 @@
       </p:grpSpPr>
       <p:sp>
         <p:nvSpPr>
-          <p:cNvPr id="2" name="Tytuł 1"/>
+          <p:cNvPr id="2" name="Title 1"/>
           <p:cNvSpPr>
             <a:spLocks noGrp="1"/>
           </p:cNvSpPr>
@@ -141,15 +141,15 @@
         </p:nvSpPr>
         <p:spPr>
           <a:xfrm>
-            <a:off x="1524000" y="1122363"/>
-            <a:ext cx="9144000" cy="2387600"/>
+            <a:off x="415766" y="589241"/>
+            <a:ext cx="4712018" cy="1253490"/>
           </a:xfrm>
         </p:spPr>
         <p:txBody>
           <a:bodyPr anchor="b"/>
           <a:lstStyle>
             <a:lvl1pPr algn="ctr">
-              <a:defRPr sz="6000"/>
+              <a:defRPr sz="3150"/>
             </a:lvl1pPr>
           </a:lstStyle>
           <a:p>
@@ -157,13 +157,13 @@
               <a:rPr lang="pl-PL" smtClean="0"/>
               <a:t>Kliknij, aby edytować styl</a:t>
             </a:r>
-            <a:endParaRPr lang="pl-PL"/>
-          </a:p>
-        </p:txBody>
-      </p:sp>
-      <p:sp>
-        <p:nvSpPr>
-          <p:cNvPr id="3" name="Podtytuł 2"/>
+            <a:endParaRPr lang="en-US" dirty="0"/>
+          </a:p>
+        </p:txBody>
+      </p:sp>
+      <p:sp>
+        <p:nvSpPr>
+          <p:cNvPr id="3" name="Subtitle 2"/>
           <p:cNvSpPr>
             <a:spLocks noGrp="1"/>
           </p:cNvSpPr>
@@ -173,8 +173,8 @@
         </p:nvSpPr>
         <p:spPr>
           <a:xfrm>
-            <a:off x="1524000" y="3602038"/>
-            <a:ext cx="9144000" cy="1655762"/>
+            <a:off x="692944" y="1891070"/>
+            <a:ext cx="4157663" cy="869275"/>
           </a:xfrm>
         </p:spPr>
         <p:txBody>
@@ -182,39 +182,39 @@
           <a:lstStyle>
             <a:lvl1pPr marL="0" indent="0" algn="ctr">
               <a:buNone/>
-              <a:defRPr sz="2400"/>
+              <a:defRPr sz="1260"/>
             </a:lvl1pPr>
-            <a:lvl2pPr marL="457200" indent="0" algn="ctr">
-              <a:buNone/>
-              <a:defRPr sz="2000"/>
+            <a:lvl2pPr marL="240030" indent="0" algn="ctr">
+              <a:buNone/>
+              <a:defRPr sz="1050"/>
             </a:lvl2pPr>
-            <a:lvl3pPr marL="914400" indent="0" algn="ctr">
-              <a:buNone/>
-              <a:defRPr sz="1800"/>
+            <a:lvl3pPr marL="480060" indent="0" algn="ctr">
+              <a:buNone/>
+              <a:defRPr sz="945"/>
             </a:lvl3pPr>
-            <a:lvl4pPr marL="1371600" indent="0" algn="ctr">
-              <a:buNone/>
-              <a:defRPr sz="1600"/>
+            <a:lvl4pPr marL="720090" indent="0" algn="ctr">
+              <a:buNone/>
+              <a:defRPr sz="840"/>
             </a:lvl4pPr>
-            <a:lvl5pPr marL="1828800" indent="0" algn="ctr">
-              <a:buNone/>
-              <a:defRPr sz="1600"/>
+            <a:lvl5pPr marL="960120" indent="0" algn="ctr">
+              <a:buNone/>
+              <a:defRPr sz="840"/>
             </a:lvl5pPr>
-            <a:lvl6pPr marL="2286000" indent="0" algn="ctr">
-              <a:buNone/>
-              <a:defRPr sz="1600"/>
+            <a:lvl6pPr marL="1200150" indent="0" algn="ctr">
+              <a:buNone/>
+              <a:defRPr sz="840"/>
             </a:lvl6pPr>
-            <a:lvl7pPr marL="2743200" indent="0" algn="ctr">
-              <a:buNone/>
-              <a:defRPr sz="1600"/>
+            <a:lvl7pPr marL="1440180" indent="0" algn="ctr">
+              <a:buNone/>
+              <a:defRPr sz="840"/>
             </a:lvl7pPr>
-            <a:lvl8pPr marL="3200400" indent="0" algn="ctr">
-              <a:buNone/>
-              <a:defRPr sz="1600"/>
+            <a:lvl8pPr marL="1680210" indent="0" algn="ctr">
+              <a:buNone/>
+              <a:defRPr sz="840"/>
             </a:lvl8pPr>
-            <a:lvl9pPr marL="3657600" indent="0" algn="ctr">
-              <a:buNone/>
-              <a:defRPr sz="1600"/>
+            <a:lvl9pPr marL="1920240" indent="0" algn="ctr">
+              <a:buNone/>
+              <a:defRPr sz="840"/>
             </a:lvl9pPr>
           </a:lstStyle>
           <a:p>
@@ -222,13 +222,13 @@
               <a:rPr lang="pl-PL" smtClean="0"/>
               <a:t>Kliknij, aby edytować styl wzorca podtytułu</a:t>
             </a:r>
-            <a:endParaRPr lang="pl-PL"/>
-          </a:p>
-        </p:txBody>
-      </p:sp>
-      <p:sp>
-        <p:nvSpPr>
-          <p:cNvPr id="4" name="Symbol zastępczy daty 3"/>
+            <a:endParaRPr lang="en-US" dirty="0"/>
+          </a:p>
+        </p:txBody>
+      </p:sp>
+      <p:sp>
+        <p:nvSpPr>
+          <p:cNvPr id="4" name="Date Placeholder 3"/>
           <p:cNvSpPr>
             <a:spLocks noGrp="1"/>
           </p:cNvSpPr>
@@ -243,7 +243,7 @@
           <a:p>
             <a:fld id="{430D1825-ADB5-4B23-B937-FDEB78A4A206}" type="datetimeFigureOut">
               <a:rPr lang="pl-PL" smtClean="0"/>
-              <a:t>31.07.2018</a:t>
+              <a:t>01.08.2018</a:t>
             </a:fld>
             <a:endParaRPr lang="pl-PL"/>
           </a:p>
@@ -251,7 +251,7 @@
       </p:sp>
       <p:sp>
         <p:nvSpPr>
-          <p:cNvPr id="5" name="Symbol zastępczy stopki 4"/>
+          <p:cNvPr id="5" name="Footer Placeholder 4"/>
           <p:cNvSpPr>
             <a:spLocks noGrp="1"/>
           </p:cNvSpPr>
@@ -270,7 +270,7 @@
       </p:sp>
       <p:sp>
         <p:nvSpPr>
-          <p:cNvPr id="6" name="Symbol zastępczy numeru slajdu 5"/>
+          <p:cNvPr id="6" name="Slide Number Placeholder 5"/>
           <p:cNvSpPr>
             <a:spLocks noGrp="1"/>
           </p:cNvSpPr>
@@ -294,7 +294,7 @@
     </p:spTree>
     <p:extLst>
       <p:ext uri="{BB962C8B-B14F-4D97-AF65-F5344CB8AC3E}">
-        <p14:creationId xmlns:p14="http://schemas.microsoft.com/office/powerpoint/2010/main" val="275457423"/>
+        <p14:creationId xmlns:p14="http://schemas.microsoft.com/office/powerpoint/2010/main" val="4231740248"/>
       </p:ext>
     </p:extLst>
   </p:cSld>
@@ -323,7 +323,7 @@
       </p:grpSpPr>
       <p:sp>
         <p:nvSpPr>
-          <p:cNvPr id="2" name="Tytuł 1"/>
+          <p:cNvPr id="2" name="Title 1"/>
           <p:cNvSpPr>
             <a:spLocks noGrp="1"/>
           </p:cNvSpPr>
@@ -340,13 +340,13 @@
               <a:rPr lang="pl-PL" smtClean="0"/>
               <a:t>Kliknij, aby edytować styl</a:t>
             </a:r>
-            <a:endParaRPr lang="pl-PL"/>
-          </a:p>
-        </p:txBody>
-      </p:sp>
-      <p:sp>
-        <p:nvSpPr>
-          <p:cNvPr id="3" name="Symbol zastępczy tytułu pionowego 2"/>
+            <a:endParaRPr lang="en-US" dirty="0"/>
+          </a:p>
+        </p:txBody>
+      </p:sp>
+      <p:sp>
+        <p:nvSpPr>
+          <p:cNvPr id="3" name="Vertical Text Placeholder 2"/>
           <p:cNvSpPr>
             <a:spLocks noGrp="1"/>
           </p:cNvSpPr>
@@ -392,13 +392,13 @@
               <a:rPr lang="pl-PL" smtClean="0"/>
               <a:t>Piąty poziom</a:t>
             </a:r>
-            <a:endParaRPr lang="pl-PL"/>
-          </a:p>
-        </p:txBody>
-      </p:sp>
-      <p:sp>
-        <p:nvSpPr>
-          <p:cNvPr id="4" name="Symbol zastępczy daty 3"/>
+            <a:endParaRPr lang="en-US" dirty="0"/>
+          </a:p>
+        </p:txBody>
+      </p:sp>
+      <p:sp>
+        <p:nvSpPr>
+          <p:cNvPr id="4" name="Date Placeholder 3"/>
           <p:cNvSpPr>
             <a:spLocks noGrp="1"/>
           </p:cNvSpPr>
@@ -413,7 +413,7 @@
           <a:p>
             <a:fld id="{430D1825-ADB5-4B23-B937-FDEB78A4A206}" type="datetimeFigureOut">
               <a:rPr lang="pl-PL" smtClean="0"/>
-              <a:t>31.07.2018</a:t>
+              <a:t>01.08.2018</a:t>
             </a:fld>
             <a:endParaRPr lang="pl-PL"/>
           </a:p>
@@ -421,7 +421,7 @@
       </p:sp>
       <p:sp>
         <p:nvSpPr>
-          <p:cNvPr id="5" name="Symbol zastępczy stopki 4"/>
+          <p:cNvPr id="5" name="Footer Placeholder 4"/>
           <p:cNvSpPr>
             <a:spLocks noGrp="1"/>
           </p:cNvSpPr>
@@ -440,7 +440,7 @@
       </p:sp>
       <p:sp>
         <p:nvSpPr>
-          <p:cNvPr id="6" name="Symbol zastępczy numeru slajdu 5"/>
+          <p:cNvPr id="6" name="Slide Number Placeholder 5"/>
           <p:cNvSpPr>
             <a:spLocks noGrp="1"/>
           </p:cNvSpPr>
@@ -464,7 +464,7 @@
     </p:spTree>
     <p:extLst>
       <p:ext uri="{BB962C8B-B14F-4D97-AF65-F5344CB8AC3E}">
-        <p14:creationId xmlns:p14="http://schemas.microsoft.com/office/powerpoint/2010/main" val="1572705657"/>
+        <p14:creationId xmlns:p14="http://schemas.microsoft.com/office/powerpoint/2010/main" val="874596188"/>
       </p:ext>
     </p:extLst>
   </p:cSld>
@@ -493,7 +493,7 @@
       </p:grpSpPr>
       <p:sp>
         <p:nvSpPr>
-          <p:cNvPr id="2" name="Tytuł pionowy 1"/>
+          <p:cNvPr id="2" name="Vertical Title 1"/>
           <p:cNvSpPr>
             <a:spLocks noGrp="1"/>
           </p:cNvSpPr>
@@ -503,8 +503,8 @@
         </p:nvSpPr>
         <p:spPr>
           <a:xfrm>
-            <a:off x="8724900" y="365125"/>
-            <a:ext cx="2628900" cy="5811838"/>
+            <a:off x="3967103" y="191691"/>
+            <a:ext cx="1195328" cy="3051215"/>
           </a:xfrm>
         </p:spPr>
         <p:txBody>
@@ -515,13 +515,13 @@
               <a:rPr lang="pl-PL" smtClean="0"/>
               <a:t>Kliknij, aby edytować styl</a:t>
             </a:r>
-            <a:endParaRPr lang="pl-PL"/>
-          </a:p>
-        </p:txBody>
-      </p:sp>
-      <p:sp>
-        <p:nvSpPr>
-          <p:cNvPr id="3" name="Symbol zastępczy tytułu pionowego 2"/>
+            <a:endParaRPr lang="en-US" dirty="0"/>
+          </a:p>
+        </p:txBody>
+      </p:sp>
+      <p:sp>
+        <p:nvSpPr>
+          <p:cNvPr id="3" name="Vertical Text Placeholder 2"/>
           <p:cNvSpPr>
             <a:spLocks noGrp="1"/>
           </p:cNvSpPr>
@@ -531,8 +531,8 @@
         </p:nvSpPr>
         <p:spPr>
           <a:xfrm>
-            <a:off x="838200" y="365125"/>
-            <a:ext cx="7734300" cy="5811838"/>
+            <a:off x="381119" y="191691"/>
+            <a:ext cx="3516690" cy="3051215"/>
           </a:xfrm>
         </p:spPr>
         <p:txBody>
@@ -572,13 +572,13 @@
               <a:rPr lang="pl-PL" smtClean="0"/>
               <a:t>Piąty poziom</a:t>
             </a:r>
-            <a:endParaRPr lang="pl-PL"/>
-          </a:p>
-        </p:txBody>
-      </p:sp>
-      <p:sp>
-        <p:nvSpPr>
-          <p:cNvPr id="4" name="Symbol zastępczy daty 3"/>
+            <a:endParaRPr lang="en-US" dirty="0"/>
+          </a:p>
+        </p:txBody>
+      </p:sp>
+      <p:sp>
+        <p:nvSpPr>
+          <p:cNvPr id="4" name="Date Placeholder 3"/>
           <p:cNvSpPr>
             <a:spLocks noGrp="1"/>
           </p:cNvSpPr>
@@ -593,7 +593,7 @@
           <a:p>
             <a:fld id="{430D1825-ADB5-4B23-B937-FDEB78A4A206}" type="datetimeFigureOut">
               <a:rPr lang="pl-PL" smtClean="0"/>
-              <a:t>31.07.2018</a:t>
+              <a:t>01.08.2018</a:t>
             </a:fld>
             <a:endParaRPr lang="pl-PL"/>
           </a:p>
@@ -601,7 +601,7 @@
       </p:sp>
       <p:sp>
         <p:nvSpPr>
-          <p:cNvPr id="5" name="Symbol zastępczy stopki 4"/>
+          <p:cNvPr id="5" name="Footer Placeholder 4"/>
           <p:cNvSpPr>
             <a:spLocks noGrp="1"/>
           </p:cNvSpPr>
@@ -620,7 +620,7 @@
       </p:sp>
       <p:sp>
         <p:nvSpPr>
-          <p:cNvPr id="6" name="Symbol zastępczy numeru slajdu 5"/>
+          <p:cNvPr id="6" name="Slide Number Placeholder 5"/>
           <p:cNvSpPr>
             <a:spLocks noGrp="1"/>
           </p:cNvSpPr>
@@ -644,7 +644,7 @@
     </p:spTree>
     <p:extLst>
       <p:ext uri="{BB962C8B-B14F-4D97-AF65-F5344CB8AC3E}">
-        <p14:creationId xmlns:p14="http://schemas.microsoft.com/office/powerpoint/2010/main" val="40253292"/>
+        <p14:creationId xmlns:p14="http://schemas.microsoft.com/office/powerpoint/2010/main" val="551679928"/>
       </p:ext>
     </p:extLst>
   </p:cSld>
@@ -673,7 +673,7 @@
       </p:grpSpPr>
       <p:sp>
         <p:nvSpPr>
-          <p:cNvPr id="2" name="Tytuł 1"/>
+          <p:cNvPr id="2" name="Title 1"/>
           <p:cNvSpPr>
             <a:spLocks noGrp="1"/>
           </p:cNvSpPr>
@@ -690,13 +690,13 @@
               <a:rPr lang="pl-PL" smtClean="0"/>
               <a:t>Kliknij, aby edytować styl</a:t>
             </a:r>
-            <a:endParaRPr lang="pl-PL"/>
-          </a:p>
-        </p:txBody>
-      </p:sp>
-      <p:sp>
-        <p:nvSpPr>
-          <p:cNvPr id="3" name="Symbol zastępczy zawartości 2"/>
+            <a:endParaRPr lang="en-US" dirty="0"/>
+          </a:p>
+        </p:txBody>
+      </p:sp>
+      <p:sp>
+        <p:nvSpPr>
+          <p:cNvPr id="3" name="Content Placeholder 2"/>
           <p:cNvSpPr>
             <a:spLocks noGrp="1"/>
           </p:cNvSpPr>
@@ -742,13 +742,13 @@
               <a:rPr lang="pl-PL" smtClean="0"/>
               <a:t>Piąty poziom</a:t>
             </a:r>
-            <a:endParaRPr lang="pl-PL"/>
-          </a:p>
-        </p:txBody>
-      </p:sp>
-      <p:sp>
-        <p:nvSpPr>
-          <p:cNvPr id="4" name="Symbol zastępczy daty 3"/>
+            <a:endParaRPr lang="en-US" dirty="0"/>
+          </a:p>
+        </p:txBody>
+      </p:sp>
+      <p:sp>
+        <p:nvSpPr>
+          <p:cNvPr id="4" name="Date Placeholder 3"/>
           <p:cNvSpPr>
             <a:spLocks noGrp="1"/>
           </p:cNvSpPr>
@@ -763,7 +763,7 @@
           <a:p>
             <a:fld id="{430D1825-ADB5-4B23-B937-FDEB78A4A206}" type="datetimeFigureOut">
               <a:rPr lang="pl-PL" smtClean="0"/>
-              <a:t>31.07.2018</a:t>
+              <a:t>01.08.2018</a:t>
             </a:fld>
             <a:endParaRPr lang="pl-PL"/>
           </a:p>
@@ -771,7 +771,7 @@
       </p:sp>
       <p:sp>
         <p:nvSpPr>
-          <p:cNvPr id="5" name="Symbol zastępczy stopki 4"/>
+          <p:cNvPr id="5" name="Footer Placeholder 4"/>
           <p:cNvSpPr>
             <a:spLocks noGrp="1"/>
           </p:cNvSpPr>
@@ -790,7 +790,7 @@
       </p:sp>
       <p:sp>
         <p:nvSpPr>
-          <p:cNvPr id="6" name="Symbol zastępczy numeru slajdu 5"/>
+          <p:cNvPr id="6" name="Slide Number Placeholder 5"/>
           <p:cNvSpPr>
             <a:spLocks noGrp="1"/>
           </p:cNvSpPr>
@@ -814,7 +814,7 @@
     </p:spTree>
     <p:extLst>
       <p:ext uri="{BB962C8B-B14F-4D97-AF65-F5344CB8AC3E}">
-        <p14:creationId xmlns:p14="http://schemas.microsoft.com/office/powerpoint/2010/main" val="2620884409"/>
+        <p14:creationId xmlns:p14="http://schemas.microsoft.com/office/powerpoint/2010/main" val="1703078211"/>
       </p:ext>
     </p:extLst>
   </p:cSld>
@@ -843,7 +843,7 @@
       </p:grpSpPr>
       <p:sp>
         <p:nvSpPr>
-          <p:cNvPr id="2" name="Tytuł 1"/>
+          <p:cNvPr id="2" name="Title 1"/>
           <p:cNvSpPr>
             <a:spLocks noGrp="1"/>
           </p:cNvSpPr>
@@ -853,15 +853,15 @@
         </p:nvSpPr>
         <p:spPr>
           <a:xfrm>
-            <a:off x="831850" y="1709738"/>
-            <a:ext cx="10515600" cy="2852737"/>
+            <a:off x="378232" y="897613"/>
+            <a:ext cx="4781312" cy="1497687"/>
           </a:xfrm>
         </p:spPr>
         <p:txBody>
           <a:bodyPr anchor="b"/>
           <a:lstStyle>
             <a:lvl1pPr>
-              <a:defRPr sz="6000"/>
+              <a:defRPr sz="3150"/>
             </a:lvl1pPr>
           </a:lstStyle>
           <a:p>
@@ -869,13 +869,13 @@
               <a:rPr lang="pl-PL" smtClean="0"/>
               <a:t>Kliknij, aby edytować styl</a:t>
             </a:r>
-            <a:endParaRPr lang="pl-PL"/>
-          </a:p>
-        </p:txBody>
-      </p:sp>
-      <p:sp>
-        <p:nvSpPr>
-          <p:cNvPr id="3" name="Symbol zastępczy tekstu 2"/>
+            <a:endParaRPr lang="en-US" dirty="0"/>
+          </a:p>
+        </p:txBody>
+      </p:sp>
+      <p:sp>
+        <p:nvSpPr>
+          <p:cNvPr id="3" name="Text Placeholder 2"/>
           <p:cNvSpPr>
             <a:spLocks noGrp="1"/>
           </p:cNvSpPr>
@@ -885,8 +885,8 @@
         </p:nvSpPr>
         <p:spPr>
           <a:xfrm>
-            <a:off x="831850" y="4589463"/>
-            <a:ext cx="10515600" cy="1500187"/>
+            <a:off x="378232" y="2409469"/>
+            <a:ext cx="4781312" cy="787598"/>
           </a:xfrm>
         </p:spPr>
         <p:txBody>
@@ -894,17 +894,15 @@
           <a:lstStyle>
             <a:lvl1pPr marL="0" indent="0">
               <a:buNone/>
-              <a:defRPr sz="2400">
+              <a:defRPr sz="1260">
                 <a:solidFill>
-                  <a:schemeClr val="tx1">
-                    <a:tint val="75000"/>
-                  </a:schemeClr>
+                  <a:schemeClr val="tx1"/>
                 </a:solidFill>
               </a:defRPr>
             </a:lvl1pPr>
-            <a:lvl2pPr marL="457200" indent="0">
-              <a:buNone/>
-              <a:defRPr sz="2000">
+            <a:lvl2pPr marL="240030" indent="0">
+              <a:buNone/>
+              <a:defRPr sz="1050">
                 <a:solidFill>
                   <a:schemeClr val="tx1">
                     <a:tint val="75000"/>
@@ -912,9 +910,9 @@
                 </a:solidFill>
               </a:defRPr>
             </a:lvl2pPr>
-            <a:lvl3pPr marL="914400" indent="0">
-              <a:buNone/>
-              <a:defRPr sz="1800">
+            <a:lvl3pPr marL="480060" indent="0">
+              <a:buNone/>
+              <a:defRPr sz="945">
                 <a:solidFill>
                   <a:schemeClr val="tx1">
                     <a:tint val="75000"/>
@@ -922,9 +920,9 @@
                 </a:solidFill>
               </a:defRPr>
             </a:lvl3pPr>
-            <a:lvl4pPr marL="1371600" indent="0">
-              <a:buNone/>
-              <a:defRPr sz="1600">
+            <a:lvl4pPr marL="720090" indent="0">
+              <a:buNone/>
+              <a:defRPr sz="840">
                 <a:solidFill>
                   <a:schemeClr val="tx1">
                     <a:tint val="75000"/>
@@ -932,9 +930,9 @@
                 </a:solidFill>
               </a:defRPr>
             </a:lvl4pPr>
-            <a:lvl5pPr marL="1828800" indent="0">
-              <a:buNone/>
-              <a:defRPr sz="1600">
+            <a:lvl5pPr marL="960120" indent="0">
+              <a:buNone/>
+              <a:defRPr sz="840">
                 <a:solidFill>
                   <a:schemeClr val="tx1">
                     <a:tint val="75000"/>
@@ -942,9 +940,9 @@
                 </a:solidFill>
               </a:defRPr>
             </a:lvl5pPr>
-            <a:lvl6pPr marL="2286000" indent="0">
-              <a:buNone/>
-              <a:defRPr sz="1600">
+            <a:lvl6pPr marL="1200150" indent="0">
+              <a:buNone/>
+              <a:defRPr sz="840">
                 <a:solidFill>
                   <a:schemeClr val="tx1">
                     <a:tint val="75000"/>
@@ -952,9 +950,9 @@
                 </a:solidFill>
               </a:defRPr>
             </a:lvl6pPr>
-            <a:lvl7pPr marL="2743200" indent="0">
-              <a:buNone/>
-              <a:defRPr sz="1600">
+            <a:lvl7pPr marL="1440180" indent="0">
+              <a:buNone/>
+              <a:defRPr sz="840">
                 <a:solidFill>
                   <a:schemeClr val="tx1">
                     <a:tint val="75000"/>
@@ -962,9 +960,9 @@
                 </a:solidFill>
               </a:defRPr>
             </a:lvl7pPr>
-            <a:lvl8pPr marL="3200400" indent="0">
-              <a:buNone/>
-              <a:defRPr sz="1600">
+            <a:lvl8pPr marL="1680210" indent="0">
+              <a:buNone/>
+              <a:defRPr sz="840">
                 <a:solidFill>
                   <a:schemeClr val="tx1">
                     <a:tint val="75000"/>
@@ -972,9 +970,9 @@
                 </a:solidFill>
               </a:defRPr>
             </a:lvl8pPr>
-            <a:lvl9pPr marL="3657600" indent="0">
-              <a:buNone/>
-              <a:defRPr sz="1600">
+            <a:lvl9pPr marL="1920240" indent="0">
+              <a:buNone/>
+              <a:defRPr sz="840">
                 <a:solidFill>
                   <a:schemeClr val="tx1">
                     <a:tint val="75000"/>
@@ -994,7 +992,7 @@
       </p:sp>
       <p:sp>
         <p:nvSpPr>
-          <p:cNvPr id="4" name="Symbol zastępczy daty 3"/>
+          <p:cNvPr id="4" name="Date Placeholder 3"/>
           <p:cNvSpPr>
             <a:spLocks noGrp="1"/>
           </p:cNvSpPr>
@@ -1009,7 +1007,7 @@
           <a:p>
             <a:fld id="{430D1825-ADB5-4B23-B937-FDEB78A4A206}" type="datetimeFigureOut">
               <a:rPr lang="pl-PL" smtClean="0"/>
-              <a:t>31.07.2018</a:t>
+              <a:t>01.08.2018</a:t>
             </a:fld>
             <a:endParaRPr lang="pl-PL"/>
           </a:p>
@@ -1017,7 +1015,7 @@
       </p:sp>
       <p:sp>
         <p:nvSpPr>
-          <p:cNvPr id="5" name="Symbol zastępczy stopki 4"/>
+          <p:cNvPr id="5" name="Footer Placeholder 4"/>
           <p:cNvSpPr>
             <a:spLocks noGrp="1"/>
           </p:cNvSpPr>
@@ -1036,7 +1034,7 @@
       </p:sp>
       <p:sp>
         <p:nvSpPr>
-          <p:cNvPr id="6" name="Symbol zastępczy numeru slajdu 5"/>
+          <p:cNvPr id="6" name="Slide Number Placeholder 5"/>
           <p:cNvSpPr>
             <a:spLocks noGrp="1"/>
           </p:cNvSpPr>
@@ -1060,7 +1058,7 @@
     </p:spTree>
     <p:extLst>
       <p:ext uri="{BB962C8B-B14F-4D97-AF65-F5344CB8AC3E}">
-        <p14:creationId xmlns:p14="http://schemas.microsoft.com/office/powerpoint/2010/main" val="3856765583"/>
+        <p14:creationId xmlns:p14="http://schemas.microsoft.com/office/powerpoint/2010/main" val="625697083"/>
       </p:ext>
     </p:extLst>
   </p:cSld>
@@ -1089,7 +1087,7 @@
       </p:grpSpPr>
       <p:sp>
         <p:nvSpPr>
-          <p:cNvPr id="2" name="Tytuł 1"/>
+          <p:cNvPr id="2" name="Title 1"/>
           <p:cNvSpPr>
             <a:spLocks noGrp="1"/>
           </p:cNvSpPr>
@@ -1106,13 +1104,13 @@
               <a:rPr lang="pl-PL" smtClean="0"/>
               <a:t>Kliknij, aby edytować styl</a:t>
             </a:r>
-            <a:endParaRPr lang="pl-PL"/>
-          </a:p>
-        </p:txBody>
-      </p:sp>
-      <p:sp>
-        <p:nvSpPr>
-          <p:cNvPr id="3" name="Symbol zastępczy zawartości 2"/>
+            <a:endParaRPr lang="en-US" dirty="0"/>
+          </a:p>
+        </p:txBody>
+      </p:sp>
+      <p:sp>
+        <p:nvSpPr>
+          <p:cNvPr id="3" name="Content Placeholder 2"/>
           <p:cNvSpPr>
             <a:spLocks noGrp="1"/>
           </p:cNvSpPr>
@@ -1122,8 +1120,8 @@
         </p:nvSpPr>
         <p:spPr>
           <a:xfrm>
-            <a:off x="838200" y="1825625"/>
-            <a:ext cx="5181600" cy="4351338"/>
+            <a:off x="381119" y="958453"/>
+            <a:ext cx="2356009" cy="2284452"/>
           </a:xfrm>
         </p:spPr>
         <p:txBody>
@@ -1163,13 +1161,13 @@
               <a:rPr lang="pl-PL" smtClean="0"/>
               <a:t>Piąty poziom</a:t>
             </a:r>
-            <a:endParaRPr lang="pl-PL"/>
-          </a:p>
-        </p:txBody>
-      </p:sp>
-      <p:sp>
-        <p:nvSpPr>
-          <p:cNvPr id="4" name="Symbol zastępczy zawartości 3"/>
+            <a:endParaRPr lang="en-US" dirty="0"/>
+          </a:p>
+        </p:txBody>
+      </p:sp>
+      <p:sp>
+        <p:nvSpPr>
+          <p:cNvPr id="4" name="Content Placeholder 3"/>
           <p:cNvSpPr>
             <a:spLocks noGrp="1"/>
           </p:cNvSpPr>
@@ -1179,8 +1177,8 @@
         </p:nvSpPr>
         <p:spPr>
           <a:xfrm>
-            <a:off x="6172200" y="1825625"/>
-            <a:ext cx="5181600" cy="4351338"/>
+            <a:off x="2806422" y="958453"/>
+            <a:ext cx="2356009" cy="2284452"/>
           </a:xfrm>
         </p:spPr>
         <p:txBody>
@@ -1220,13 +1218,13 @@
               <a:rPr lang="pl-PL" smtClean="0"/>
               <a:t>Piąty poziom</a:t>
             </a:r>
-            <a:endParaRPr lang="pl-PL"/>
-          </a:p>
-        </p:txBody>
-      </p:sp>
-      <p:sp>
-        <p:nvSpPr>
-          <p:cNvPr id="5" name="Symbol zastępczy daty 4"/>
+            <a:endParaRPr lang="en-US" dirty="0"/>
+          </a:p>
+        </p:txBody>
+      </p:sp>
+      <p:sp>
+        <p:nvSpPr>
+          <p:cNvPr id="5" name="Date Placeholder 4"/>
           <p:cNvSpPr>
             <a:spLocks noGrp="1"/>
           </p:cNvSpPr>
@@ -1241,7 +1239,7 @@
           <a:p>
             <a:fld id="{430D1825-ADB5-4B23-B937-FDEB78A4A206}" type="datetimeFigureOut">
               <a:rPr lang="pl-PL" smtClean="0"/>
-              <a:t>31.07.2018</a:t>
+              <a:t>01.08.2018</a:t>
             </a:fld>
             <a:endParaRPr lang="pl-PL"/>
           </a:p>
@@ -1249,7 +1247,7 @@
       </p:sp>
       <p:sp>
         <p:nvSpPr>
-          <p:cNvPr id="6" name="Symbol zastępczy stopki 5"/>
+          <p:cNvPr id="6" name="Footer Placeholder 5"/>
           <p:cNvSpPr>
             <a:spLocks noGrp="1"/>
           </p:cNvSpPr>
@@ -1268,7 +1266,7 @@
       </p:sp>
       <p:sp>
         <p:nvSpPr>
-          <p:cNvPr id="7" name="Symbol zastępczy numeru slajdu 6"/>
+          <p:cNvPr id="7" name="Slide Number Placeholder 6"/>
           <p:cNvSpPr>
             <a:spLocks noGrp="1"/>
           </p:cNvSpPr>
@@ -1292,7 +1290,7 @@
     </p:spTree>
     <p:extLst>
       <p:ext uri="{BB962C8B-B14F-4D97-AF65-F5344CB8AC3E}">
-        <p14:creationId xmlns:p14="http://schemas.microsoft.com/office/powerpoint/2010/main" val="1685583427"/>
+        <p14:creationId xmlns:p14="http://schemas.microsoft.com/office/powerpoint/2010/main" val="3050202779"/>
       </p:ext>
     </p:extLst>
   </p:cSld>
@@ -1321,7 +1319,7 @@
       </p:grpSpPr>
       <p:sp>
         <p:nvSpPr>
-          <p:cNvPr id="2" name="Tytuł 1"/>
+          <p:cNvPr id="2" name="Title 1"/>
           <p:cNvSpPr>
             <a:spLocks noGrp="1"/>
           </p:cNvSpPr>
@@ -1331,8 +1329,8 @@
         </p:nvSpPr>
         <p:spPr>
           <a:xfrm>
-            <a:off x="839788" y="365125"/>
-            <a:ext cx="10515600" cy="1325563"/>
+            <a:off x="381841" y="191691"/>
+            <a:ext cx="4781312" cy="695921"/>
           </a:xfrm>
         </p:spPr>
         <p:txBody>
@@ -1343,13 +1341,13 @@
               <a:rPr lang="pl-PL" smtClean="0"/>
               <a:t>Kliknij, aby edytować styl</a:t>
             </a:r>
-            <a:endParaRPr lang="pl-PL"/>
-          </a:p>
-        </p:txBody>
-      </p:sp>
-      <p:sp>
-        <p:nvSpPr>
-          <p:cNvPr id="3" name="Symbol zastępczy tekstu 2"/>
+            <a:endParaRPr lang="en-US" dirty="0"/>
+          </a:p>
+        </p:txBody>
+      </p:sp>
+      <p:sp>
+        <p:nvSpPr>
+          <p:cNvPr id="3" name="Text Placeholder 2"/>
           <p:cNvSpPr>
             <a:spLocks noGrp="1"/>
           </p:cNvSpPr>
@@ -1359,8 +1357,8 @@
         </p:nvSpPr>
         <p:spPr>
           <a:xfrm>
-            <a:off x="839788" y="1681163"/>
-            <a:ext cx="5157787" cy="823912"/>
+            <a:off x="381842" y="882610"/>
+            <a:ext cx="2345181" cy="432554"/>
           </a:xfrm>
         </p:spPr>
         <p:txBody>
@@ -1368,39 +1366,39 @@
           <a:lstStyle>
             <a:lvl1pPr marL="0" indent="0">
               <a:buNone/>
-              <a:defRPr sz="2400" b="1"/>
+              <a:defRPr sz="1260" b="1"/>
             </a:lvl1pPr>
-            <a:lvl2pPr marL="457200" indent="0">
-              <a:buNone/>
-              <a:defRPr sz="2000" b="1"/>
+            <a:lvl2pPr marL="240030" indent="0">
+              <a:buNone/>
+              <a:defRPr sz="1050" b="1"/>
             </a:lvl2pPr>
-            <a:lvl3pPr marL="914400" indent="0">
-              <a:buNone/>
-              <a:defRPr sz="1800" b="1"/>
+            <a:lvl3pPr marL="480060" indent="0">
+              <a:buNone/>
+              <a:defRPr sz="945" b="1"/>
             </a:lvl3pPr>
-            <a:lvl4pPr marL="1371600" indent="0">
-              <a:buNone/>
-              <a:defRPr sz="1600" b="1"/>
+            <a:lvl4pPr marL="720090" indent="0">
+              <a:buNone/>
+              <a:defRPr sz="840" b="1"/>
             </a:lvl4pPr>
-            <a:lvl5pPr marL="1828800" indent="0">
-              <a:buNone/>
-              <a:defRPr sz="1600" b="1"/>
+            <a:lvl5pPr marL="960120" indent="0">
+              <a:buNone/>
+              <a:defRPr sz="840" b="1"/>
             </a:lvl5pPr>
-            <a:lvl6pPr marL="2286000" indent="0">
-              <a:buNone/>
-              <a:defRPr sz="1600" b="1"/>
+            <a:lvl6pPr marL="1200150" indent="0">
+              <a:buNone/>
+              <a:defRPr sz="840" b="1"/>
             </a:lvl6pPr>
-            <a:lvl7pPr marL="2743200" indent="0">
-              <a:buNone/>
-              <a:defRPr sz="1600" b="1"/>
+            <a:lvl7pPr marL="1440180" indent="0">
+              <a:buNone/>
+              <a:defRPr sz="840" b="1"/>
             </a:lvl7pPr>
-            <a:lvl8pPr marL="3200400" indent="0">
-              <a:buNone/>
-              <a:defRPr sz="1600" b="1"/>
+            <a:lvl8pPr marL="1680210" indent="0">
+              <a:buNone/>
+              <a:defRPr sz="840" b="1"/>
             </a:lvl8pPr>
-            <a:lvl9pPr marL="3657600" indent="0">
-              <a:buNone/>
-              <a:defRPr sz="1600" b="1"/>
+            <a:lvl9pPr marL="1920240" indent="0">
+              <a:buNone/>
+              <a:defRPr sz="840" b="1"/>
             </a:lvl9pPr>
           </a:lstStyle>
           <a:p>
@@ -1414,7 +1412,7 @@
       </p:sp>
       <p:sp>
         <p:nvSpPr>
-          <p:cNvPr id="4" name="Symbol zastępczy zawartości 3"/>
+          <p:cNvPr id="4" name="Content Placeholder 3"/>
           <p:cNvSpPr>
             <a:spLocks noGrp="1"/>
           </p:cNvSpPr>
@@ -1424,8 +1422,8 @@
         </p:nvSpPr>
         <p:spPr>
           <a:xfrm>
-            <a:off x="839788" y="2505075"/>
-            <a:ext cx="5157787" cy="3684588"/>
+            <a:off x="381842" y="1315164"/>
+            <a:ext cx="2345181" cy="1934409"/>
           </a:xfrm>
         </p:spPr>
         <p:txBody>
@@ -1465,13 +1463,13 @@
               <a:rPr lang="pl-PL" smtClean="0"/>
               <a:t>Piąty poziom</a:t>
             </a:r>
-            <a:endParaRPr lang="pl-PL"/>
-          </a:p>
-        </p:txBody>
-      </p:sp>
-      <p:sp>
-        <p:nvSpPr>
-          <p:cNvPr id="5" name="Symbol zastępczy tekstu 4"/>
+            <a:endParaRPr lang="en-US" dirty="0"/>
+          </a:p>
+        </p:txBody>
+      </p:sp>
+      <p:sp>
+        <p:nvSpPr>
+          <p:cNvPr id="5" name="Text Placeholder 4"/>
           <p:cNvSpPr>
             <a:spLocks noGrp="1"/>
           </p:cNvSpPr>
@@ -1481,8 +1479,8 @@
         </p:nvSpPr>
         <p:spPr>
           <a:xfrm>
-            <a:off x="6172200" y="1681163"/>
-            <a:ext cx="5183188" cy="823912"/>
+            <a:off x="2806422" y="882610"/>
+            <a:ext cx="2356731" cy="432554"/>
           </a:xfrm>
         </p:spPr>
         <p:txBody>
@@ -1490,39 +1488,39 @@
           <a:lstStyle>
             <a:lvl1pPr marL="0" indent="0">
               <a:buNone/>
-              <a:defRPr sz="2400" b="1"/>
+              <a:defRPr sz="1260" b="1"/>
             </a:lvl1pPr>
-            <a:lvl2pPr marL="457200" indent="0">
-              <a:buNone/>
-              <a:defRPr sz="2000" b="1"/>
+            <a:lvl2pPr marL="240030" indent="0">
+              <a:buNone/>
+              <a:defRPr sz="1050" b="1"/>
             </a:lvl2pPr>
-            <a:lvl3pPr marL="914400" indent="0">
-              <a:buNone/>
-              <a:defRPr sz="1800" b="1"/>
+            <a:lvl3pPr marL="480060" indent="0">
+              <a:buNone/>
+              <a:defRPr sz="945" b="1"/>
             </a:lvl3pPr>
-            <a:lvl4pPr marL="1371600" indent="0">
-              <a:buNone/>
-              <a:defRPr sz="1600" b="1"/>
+            <a:lvl4pPr marL="720090" indent="0">
+              <a:buNone/>
+              <a:defRPr sz="840" b="1"/>
             </a:lvl4pPr>
-            <a:lvl5pPr marL="1828800" indent="0">
-              <a:buNone/>
-              <a:defRPr sz="1600" b="1"/>
+            <a:lvl5pPr marL="960120" indent="0">
+              <a:buNone/>
+              <a:defRPr sz="840" b="1"/>
             </a:lvl5pPr>
-            <a:lvl6pPr marL="2286000" indent="0">
-              <a:buNone/>
-              <a:defRPr sz="1600" b="1"/>
+            <a:lvl6pPr marL="1200150" indent="0">
+              <a:buNone/>
+              <a:defRPr sz="840" b="1"/>
             </a:lvl6pPr>
-            <a:lvl7pPr marL="2743200" indent="0">
-              <a:buNone/>
-              <a:defRPr sz="1600" b="1"/>
+            <a:lvl7pPr marL="1440180" indent="0">
+              <a:buNone/>
+              <a:defRPr sz="840" b="1"/>
             </a:lvl7pPr>
-            <a:lvl8pPr marL="3200400" indent="0">
-              <a:buNone/>
-              <a:defRPr sz="1600" b="1"/>
+            <a:lvl8pPr marL="1680210" indent="0">
+              <a:buNone/>
+              <a:defRPr sz="840" b="1"/>
             </a:lvl8pPr>
-            <a:lvl9pPr marL="3657600" indent="0">
-              <a:buNone/>
-              <a:defRPr sz="1600" b="1"/>
+            <a:lvl9pPr marL="1920240" indent="0">
+              <a:buNone/>
+              <a:defRPr sz="840" b="1"/>
             </a:lvl9pPr>
           </a:lstStyle>
           <a:p>
@@ -1536,7 +1534,7 @@
       </p:sp>
       <p:sp>
         <p:nvSpPr>
-          <p:cNvPr id="6" name="Symbol zastępczy zawartości 5"/>
+          <p:cNvPr id="6" name="Content Placeholder 5"/>
           <p:cNvSpPr>
             <a:spLocks noGrp="1"/>
           </p:cNvSpPr>
@@ -1546,8 +1544,8 @@
         </p:nvSpPr>
         <p:spPr>
           <a:xfrm>
-            <a:off x="6172200" y="2505075"/>
-            <a:ext cx="5183188" cy="3684588"/>
+            <a:off x="2806422" y="1315164"/>
+            <a:ext cx="2356731" cy="1934409"/>
           </a:xfrm>
         </p:spPr>
         <p:txBody>
@@ -1587,13 +1585,13 @@
               <a:rPr lang="pl-PL" smtClean="0"/>
               <a:t>Piąty poziom</a:t>
             </a:r>
-            <a:endParaRPr lang="pl-PL"/>
-          </a:p>
-        </p:txBody>
-      </p:sp>
-      <p:sp>
-        <p:nvSpPr>
-          <p:cNvPr id="7" name="Symbol zastępczy daty 6"/>
+            <a:endParaRPr lang="en-US" dirty="0"/>
+          </a:p>
+        </p:txBody>
+      </p:sp>
+      <p:sp>
+        <p:nvSpPr>
+          <p:cNvPr id="7" name="Date Placeholder 6"/>
           <p:cNvSpPr>
             <a:spLocks noGrp="1"/>
           </p:cNvSpPr>
@@ -1608,7 +1606,7 @@
           <a:p>
             <a:fld id="{430D1825-ADB5-4B23-B937-FDEB78A4A206}" type="datetimeFigureOut">
               <a:rPr lang="pl-PL" smtClean="0"/>
-              <a:t>31.07.2018</a:t>
+              <a:t>01.08.2018</a:t>
             </a:fld>
             <a:endParaRPr lang="pl-PL"/>
           </a:p>
@@ -1616,7 +1614,7 @@
       </p:sp>
       <p:sp>
         <p:nvSpPr>
-          <p:cNvPr id="8" name="Symbol zastępczy stopki 7"/>
+          <p:cNvPr id="8" name="Footer Placeholder 7"/>
           <p:cNvSpPr>
             <a:spLocks noGrp="1"/>
           </p:cNvSpPr>
@@ -1635,7 +1633,7 @@
       </p:sp>
       <p:sp>
         <p:nvSpPr>
-          <p:cNvPr id="9" name="Symbol zastępczy numeru slajdu 8"/>
+          <p:cNvPr id="9" name="Slide Number Placeholder 8"/>
           <p:cNvSpPr>
             <a:spLocks noGrp="1"/>
           </p:cNvSpPr>
@@ -1659,7 +1657,7 @@
     </p:spTree>
     <p:extLst>
       <p:ext uri="{BB962C8B-B14F-4D97-AF65-F5344CB8AC3E}">
-        <p14:creationId xmlns:p14="http://schemas.microsoft.com/office/powerpoint/2010/main" val="1252220619"/>
+        <p14:creationId xmlns:p14="http://schemas.microsoft.com/office/powerpoint/2010/main" val="3852959818"/>
       </p:ext>
     </p:extLst>
   </p:cSld>
@@ -1688,7 +1686,7 @@
       </p:grpSpPr>
       <p:sp>
         <p:nvSpPr>
-          <p:cNvPr id="2" name="Tytuł 1"/>
+          <p:cNvPr id="2" name="Title 1"/>
           <p:cNvSpPr>
             <a:spLocks noGrp="1"/>
           </p:cNvSpPr>
@@ -1705,13 +1703,13 @@
               <a:rPr lang="pl-PL" smtClean="0"/>
               <a:t>Kliknij, aby edytować styl</a:t>
             </a:r>
-            <a:endParaRPr lang="pl-PL"/>
-          </a:p>
-        </p:txBody>
-      </p:sp>
-      <p:sp>
-        <p:nvSpPr>
-          <p:cNvPr id="3" name="Symbol zastępczy daty 2"/>
+            <a:endParaRPr lang="en-US" dirty="0"/>
+          </a:p>
+        </p:txBody>
+      </p:sp>
+      <p:sp>
+        <p:nvSpPr>
+          <p:cNvPr id="3" name="Date Placeholder 2"/>
           <p:cNvSpPr>
             <a:spLocks noGrp="1"/>
           </p:cNvSpPr>
@@ -1726,7 +1724,7 @@
           <a:p>
             <a:fld id="{430D1825-ADB5-4B23-B937-FDEB78A4A206}" type="datetimeFigureOut">
               <a:rPr lang="pl-PL" smtClean="0"/>
-              <a:t>31.07.2018</a:t>
+              <a:t>01.08.2018</a:t>
             </a:fld>
             <a:endParaRPr lang="pl-PL"/>
           </a:p>
@@ -1734,7 +1732,7 @@
       </p:sp>
       <p:sp>
         <p:nvSpPr>
-          <p:cNvPr id="4" name="Symbol zastępczy stopki 3"/>
+          <p:cNvPr id="4" name="Footer Placeholder 3"/>
           <p:cNvSpPr>
             <a:spLocks noGrp="1"/>
           </p:cNvSpPr>
@@ -1753,7 +1751,7 @@
       </p:sp>
       <p:sp>
         <p:nvSpPr>
-          <p:cNvPr id="5" name="Symbol zastępczy numeru slajdu 4"/>
+          <p:cNvPr id="5" name="Slide Number Placeholder 4"/>
           <p:cNvSpPr>
             <a:spLocks noGrp="1"/>
           </p:cNvSpPr>
@@ -1777,7 +1775,7 @@
     </p:spTree>
     <p:extLst>
       <p:ext uri="{BB962C8B-B14F-4D97-AF65-F5344CB8AC3E}">
-        <p14:creationId xmlns:p14="http://schemas.microsoft.com/office/powerpoint/2010/main" val="909340594"/>
+        <p14:creationId xmlns:p14="http://schemas.microsoft.com/office/powerpoint/2010/main" val="742858831"/>
       </p:ext>
     </p:extLst>
   </p:cSld>
@@ -1806,7 +1804,7 @@
       </p:grpSpPr>
       <p:sp>
         <p:nvSpPr>
-          <p:cNvPr id="2" name="Symbol zastępczy daty 1"/>
+          <p:cNvPr id="2" name="Date Placeholder 1"/>
           <p:cNvSpPr>
             <a:spLocks noGrp="1"/>
           </p:cNvSpPr>
@@ -1821,7 +1819,7 @@
           <a:p>
             <a:fld id="{430D1825-ADB5-4B23-B937-FDEB78A4A206}" type="datetimeFigureOut">
               <a:rPr lang="pl-PL" smtClean="0"/>
-              <a:t>31.07.2018</a:t>
+              <a:t>01.08.2018</a:t>
             </a:fld>
             <a:endParaRPr lang="pl-PL"/>
           </a:p>
@@ -1829,7 +1827,7 @@
       </p:sp>
       <p:sp>
         <p:nvSpPr>
-          <p:cNvPr id="3" name="Symbol zastępczy stopki 2"/>
+          <p:cNvPr id="3" name="Footer Placeholder 2"/>
           <p:cNvSpPr>
             <a:spLocks noGrp="1"/>
           </p:cNvSpPr>
@@ -1848,7 +1846,7 @@
       </p:sp>
       <p:sp>
         <p:nvSpPr>
-          <p:cNvPr id="4" name="Symbol zastępczy numeru slajdu 3"/>
+          <p:cNvPr id="4" name="Slide Number Placeholder 3"/>
           <p:cNvSpPr>
             <a:spLocks noGrp="1"/>
           </p:cNvSpPr>
@@ -1872,7 +1870,7 @@
     </p:spTree>
     <p:extLst>
       <p:ext uri="{BB962C8B-B14F-4D97-AF65-F5344CB8AC3E}">
-        <p14:creationId xmlns:p14="http://schemas.microsoft.com/office/powerpoint/2010/main" val="2862317499"/>
+        <p14:creationId xmlns:p14="http://schemas.microsoft.com/office/powerpoint/2010/main" val="1041537449"/>
       </p:ext>
     </p:extLst>
   </p:cSld>
@@ -1901,7 +1899,7 @@
       </p:grpSpPr>
       <p:sp>
         <p:nvSpPr>
-          <p:cNvPr id="2" name="Tytuł 1"/>
+          <p:cNvPr id="2" name="Title 1"/>
           <p:cNvSpPr>
             <a:spLocks noGrp="1"/>
           </p:cNvSpPr>
@@ -1911,15 +1909,15 @@
         </p:nvSpPr>
         <p:spPr>
           <a:xfrm>
-            <a:off x="839788" y="457200"/>
-            <a:ext cx="3932237" cy="1600200"/>
+            <a:off x="381841" y="240030"/>
+            <a:ext cx="1787939" cy="840105"/>
           </a:xfrm>
         </p:spPr>
         <p:txBody>
           <a:bodyPr anchor="b"/>
           <a:lstStyle>
             <a:lvl1pPr>
-              <a:defRPr sz="3200"/>
+              <a:defRPr sz="1680"/>
             </a:lvl1pPr>
           </a:lstStyle>
           <a:p>
@@ -1927,13 +1925,13 @@
               <a:rPr lang="pl-PL" smtClean="0"/>
               <a:t>Kliknij, aby edytować styl</a:t>
             </a:r>
-            <a:endParaRPr lang="pl-PL"/>
-          </a:p>
-        </p:txBody>
-      </p:sp>
-      <p:sp>
-        <p:nvSpPr>
-          <p:cNvPr id="3" name="Symbol zastępczy zawartości 2"/>
+            <a:endParaRPr lang="en-US" dirty="0"/>
+          </a:p>
+        </p:txBody>
+      </p:sp>
+      <p:sp>
+        <p:nvSpPr>
+          <p:cNvPr id="3" name="Content Placeholder 2"/>
           <p:cNvSpPr>
             <a:spLocks noGrp="1"/>
           </p:cNvSpPr>
@@ -1943,39 +1941,39 @@
         </p:nvSpPr>
         <p:spPr>
           <a:xfrm>
-            <a:off x="5183188" y="987425"/>
-            <a:ext cx="6172200" cy="4873625"/>
+            <a:off x="2356731" y="518399"/>
+            <a:ext cx="2806422" cy="2558653"/>
           </a:xfrm>
         </p:spPr>
         <p:txBody>
           <a:bodyPr/>
           <a:lstStyle>
             <a:lvl1pPr>
-              <a:defRPr sz="3200"/>
+              <a:defRPr sz="1680"/>
             </a:lvl1pPr>
             <a:lvl2pPr>
-              <a:defRPr sz="2800"/>
+              <a:defRPr sz="1470"/>
             </a:lvl2pPr>
             <a:lvl3pPr>
-              <a:defRPr sz="2400"/>
+              <a:defRPr sz="1260"/>
             </a:lvl3pPr>
             <a:lvl4pPr>
-              <a:defRPr sz="2000"/>
+              <a:defRPr sz="1050"/>
             </a:lvl4pPr>
             <a:lvl5pPr>
-              <a:defRPr sz="2000"/>
+              <a:defRPr sz="1050"/>
             </a:lvl5pPr>
             <a:lvl6pPr>
-              <a:defRPr sz="2000"/>
+              <a:defRPr sz="1050"/>
             </a:lvl6pPr>
             <a:lvl7pPr>
-              <a:defRPr sz="2000"/>
+              <a:defRPr sz="1050"/>
             </a:lvl7pPr>
             <a:lvl8pPr>
-              <a:defRPr sz="2000"/>
+              <a:defRPr sz="1050"/>
             </a:lvl8pPr>
             <a:lvl9pPr>
-              <a:defRPr sz="2000"/>
+              <a:defRPr sz="1050"/>
             </a:lvl9pPr>
           </a:lstStyle>
           <a:p>
@@ -2012,13 +2010,13 @@
               <a:rPr lang="pl-PL" smtClean="0"/>
               <a:t>Piąty poziom</a:t>
             </a:r>
-            <a:endParaRPr lang="pl-PL"/>
-          </a:p>
-        </p:txBody>
-      </p:sp>
-      <p:sp>
-        <p:nvSpPr>
-          <p:cNvPr id="4" name="Symbol zastępczy tekstu 3"/>
+            <a:endParaRPr lang="en-US" dirty="0"/>
+          </a:p>
+        </p:txBody>
+      </p:sp>
+      <p:sp>
+        <p:nvSpPr>
+          <p:cNvPr id="4" name="Text Placeholder 3"/>
           <p:cNvSpPr>
             <a:spLocks noGrp="1"/>
           </p:cNvSpPr>
@@ -2028,8 +2026,8 @@
         </p:nvSpPr>
         <p:spPr>
           <a:xfrm>
-            <a:off x="839788" y="2057400"/>
-            <a:ext cx="3932237" cy="3811588"/>
+            <a:off x="381841" y="1080135"/>
+            <a:ext cx="1787939" cy="2001084"/>
           </a:xfrm>
         </p:spPr>
         <p:txBody>
@@ -2037,39 +2035,39 @@
           <a:lstStyle>
             <a:lvl1pPr marL="0" indent="0">
               <a:buNone/>
-              <a:defRPr sz="1600"/>
+              <a:defRPr sz="840"/>
             </a:lvl1pPr>
-            <a:lvl2pPr marL="457200" indent="0">
-              <a:buNone/>
-              <a:defRPr sz="1400"/>
+            <a:lvl2pPr marL="240030" indent="0">
+              <a:buNone/>
+              <a:defRPr sz="735"/>
             </a:lvl2pPr>
-            <a:lvl3pPr marL="914400" indent="0">
-              <a:buNone/>
-              <a:defRPr sz="1200"/>
+            <a:lvl3pPr marL="480060" indent="0">
+              <a:buNone/>
+              <a:defRPr sz="630"/>
             </a:lvl3pPr>
-            <a:lvl4pPr marL="1371600" indent="0">
-              <a:buNone/>
-              <a:defRPr sz="1000"/>
+            <a:lvl4pPr marL="720090" indent="0">
+              <a:buNone/>
+              <a:defRPr sz="525"/>
             </a:lvl4pPr>
-            <a:lvl5pPr marL="1828800" indent="0">
-              <a:buNone/>
-              <a:defRPr sz="1000"/>
+            <a:lvl5pPr marL="960120" indent="0">
+              <a:buNone/>
+              <a:defRPr sz="525"/>
             </a:lvl5pPr>
-            <a:lvl6pPr marL="2286000" indent="0">
-              <a:buNone/>
-              <a:defRPr sz="1000"/>
+            <a:lvl6pPr marL="1200150" indent="0">
+              <a:buNone/>
+              <a:defRPr sz="525"/>
             </a:lvl6pPr>
-            <a:lvl7pPr marL="2743200" indent="0">
-              <a:buNone/>
-              <a:defRPr sz="1000"/>
+            <a:lvl7pPr marL="1440180" indent="0">
+              <a:buNone/>
+              <a:defRPr sz="525"/>
             </a:lvl7pPr>
-            <a:lvl8pPr marL="3200400" indent="0">
-              <a:buNone/>
-              <a:defRPr sz="1000"/>
+            <a:lvl8pPr marL="1680210" indent="0">
+              <a:buNone/>
+              <a:defRPr sz="525"/>
             </a:lvl8pPr>
-            <a:lvl9pPr marL="3657600" indent="0">
-              <a:buNone/>
-              <a:defRPr sz="1000"/>
+            <a:lvl9pPr marL="1920240" indent="0">
+              <a:buNone/>
+              <a:defRPr sz="525"/>
             </a:lvl9pPr>
           </a:lstStyle>
           <a:p>
@@ -2083,7 +2081,7 @@
       </p:sp>
       <p:sp>
         <p:nvSpPr>
-          <p:cNvPr id="5" name="Symbol zastępczy daty 4"/>
+          <p:cNvPr id="5" name="Date Placeholder 4"/>
           <p:cNvSpPr>
             <a:spLocks noGrp="1"/>
           </p:cNvSpPr>
@@ -2098,7 +2096,7 @@
           <a:p>
             <a:fld id="{430D1825-ADB5-4B23-B937-FDEB78A4A206}" type="datetimeFigureOut">
               <a:rPr lang="pl-PL" smtClean="0"/>
-              <a:t>31.07.2018</a:t>
+              <a:t>01.08.2018</a:t>
             </a:fld>
             <a:endParaRPr lang="pl-PL"/>
           </a:p>
@@ -2106,7 +2104,7 @@
       </p:sp>
       <p:sp>
         <p:nvSpPr>
-          <p:cNvPr id="6" name="Symbol zastępczy stopki 5"/>
+          <p:cNvPr id="6" name="Footer Placeholder 5"/>
           <p:cNvSpPr>
             <a:spLocks noGrp="1"/>
           </p:cNvSpPr>
@@ -2125,7 +2123,7 @@
       </p:sp>
       <p:sp>
         <p:nvSpPr>
-          <p:cNvPr id="7" name="Symbol zastępczy numeru slajdu 6"/>
+          <p:cNvPr id="7" name="Slide Number Placeholder 6"/>
           <p:cNvSpPr>
             <a:spLocks noGrp="1"/>
           </p:cNvSpPr>
@@ -2149,7 +2147,7 @@
     </p:spTree>
     <p:extLst>
       <p:ext uri="{BB962C8B-B14F-4D97-AF65-F5344CB8AC3E}">
-        <p14:creationId xmlns:p14="http://schemas.microsoft.com/office/powerpoint/2010/main" val="3882959028"/>
+        <p14:creationId xmlns:p14="http://schemas.microsoft.com/office/powerpoint/2010/main" val="523133303"/>
       </p:ext>
     </p:extLst>
   </p:cSld>
@@ -2178,7 +2176,7 @@
       </p:grpSpPr>
       <p:sp>
         <p:nvSpPr>
-          <p:cNvPr id="2" name="Tytuł 1"/>
+          <p:cNvPr id="2" name="Title 1"/>
           <p:cNvSpPr>
             <a:spLocks noGrp="1"/>
           </p:cNvSpPr>
@@ -2188,15 +2186,15 @@
         </p:nvSpPr>
         <p:spPr>
           <a:xfrm>
-            <a:off x="839788" y="457200"/>
-            <a:ext cx="3932237" cy="1600200"/>
+            <a:off x="381841" y="240030"/>
+            <a:ext cx="1787939" cy="840105"/>
           </a:xfrm>
         </p:spPr>
         <p:txBody>
           <a:bodyPr anchor="b"/>
           <a:lstStyle>
             <a:lvl1pPr>
-              <a:defRPr sz="3200"/>
+              <a:defRPr sz="1680"/>
             </a:lvl1pPr>
           </a:lstStyle>
           <a:p>
@@ -2204,15 +2202,15 @@
               <a:rPr lang="pl-PL" smtClean="0"/>
               <a:t>Kliknij, aby edytować styl</a:t>
             </a:r>
-            <a:endParaRPr lang="pl-PL"/>
-          </a:p>
-        </p:txBody>
-      </p:sp>
-      <p:sp>
-        <p:nvSpPr>
-          <p:cNvPr id="3" name="Symbol zastępczy obrazu 2"/>
-          <p:cNvSpPr>
-            <a:spLocks noGrp="1"/>
+            <a:endParaRPr lang="en-US" dirty="0"/>
+          </a:p>
+        </p:txBody>
+      </p:sp>
+      <p:sp>
+        <p:nvSpPr>
+          <p:cNvPr id="3" name="Picture Placeholder 2"/>
+          <p:cNvSpPr>
+            <a:spLocks noGrp="1" noChangeAspect="1"/>
           </p:cNvSpPr>
           <p:nvPr>
             <p:ph type="pic" idx="1"/>
@@ -2220,58 +2218,62 @@
         </p:nvSpPr>
         <p:spPr>
           <a:xfrm>
-            <a:off x="5183188" y="987425"/>
-            <a:ext cx="6172200" cy="4873625"/>
+            <a:off x="2356731" y="518399"/>
+            <a:ext cx="2806422" cy="2558653"/>
           </a:xfrm>
         </p:spPr>
         <p:txBody>
-          <a:bodyPr/>
+          <a:bodyPr anchor="t"/>
           <a:lstStyle>
             <a:lvl1pPr marL="0" indent="0">
               <a:buNone/>
-              <a:defRPr sz="3200"/>
+              <a:defRPr sz="1680"/>
             </a:lvl1pPr>
-            <a:lvl2pPr marL="457200" indent="0">
-              <a:buNone/>
-              <a:defRPr sz="2800"/>
+            <a:lvl2pPr marL="240030" indent="0">
+              <a:buNone/>
+              <a:defRPr sz="1470"/>
             </a:lvl2pPr>
-            <a:lvl3pPr marL="914400" indent="0">
-              <a:buNone/>
-              <a:defRPr sz="2400"/>
+            <a:lvl3pPr marL="480060" indent="0">
+              <a:buNone/>
+              <a:defRPr sz="1260"/>
             </a:lvl3pPr>
-            <a:lvl4pPr marL="1371600" indent="0">
-              <a:buNone/>
-              <a:defRPr sz="2000"/>
+            <a:lvl4pPr marL="720090" indent="0">
+              <a:buNone/>
+              <a:defRPr sz="1050"/>
             </a:lvl4pPr>
-            <a:lvl5pPr marL="1828800" indent="0">
-              <a:buNone/>
-              <a:defRPr sz="2000"/>
+            <a:lvl5pPr marL="960120" indent="0">
+              <a:buNone/>
+              <a:defRPr sz="1050"/>
             </a:lvl5pPr>
-            <a:lvl6pPr marL="2286000" indent="0">
-              <a:buNone/>
-              <a:defRPr sz="2000"/>
+            <a:lvl6pPr marL="1200150" indent="0">
+              <a:buNone/>
+              <a:defRPr sz="1050"/>
             </a:lvl6pPr>
-            <a:lvl7pPr marL="2743200" indent="0">
-              <a:buNone/>
-              <a:defRPr sz="2000"/>
+            <a:lvl7pPr marL="1440180" indent="0">
+              <a:buNone/>
+              <a:defRPr sz="1050"/>
             </a:lvl7pPr>
-            <a:lvl8pPr marL="3200400" indent="0">
-              <a:buNone/>
-              <a:defRPr sz="2000"/>
+            <a:lvl8pPr marL="1680210" indent="0">
+              <a:buNone/>
+              <a:defRPr sz="1050"/>
             </a:lvl8pPr>
-            <a:lvl9pPr marL="3657600" indent="0">
-              <a:buNone/>
-              <a:defRPr sz="2000"/>
+            <a:lvl9pPr marL="1920240" indent="0">
+              <a:buNone/>
+              <a:defRPr sz="1050"/>
             </a:lvl9pPr>
           </a:lstStyle>
           <a:p>
-            <a:endParaRPr lang="pl-PL"/>
-          </a:p>
-        </p:txBody>
-      </p:sp>
-      <p:sp>
-        <p:nvSpPr>
-          <p:cNvPr id="4" name="Symbol zastępczy tekstu 3"/>
+            <a:r>
+              <a:rPr lang="pl-PL" smtClean="0"/>
+              <a:t>Kliknij ikonę, aby dodać obraz</a:t>
+            </a:r>
+            <a:endParaRPr lang="en-US" dirty="0"/>
+          </a:p>
+        </p:txBody>
+      </p:sp>
+      <p:sp>
+        <p:nvSpPr>
+          <p:cNvPr id="4" name="Text Placeholder 3"/>
           <p:cNvSpPr>
             <a:spLocks noGrp="1"/>
           </p:cNvSpPr>
@@ -2281,8 +2283,8 @@
         </p:nvSpPr>
         <p:spPr>
           <a:xfrm>
-            <a:off x="839788" y="2057400"/>
-            <a:ext cx="3932237" cy="3811588"/>
+            <a:off x="381841" y="1080135"/>
+            <a:ext cx="1787939" cy="2001084"/>
           </a:xfrm>
         </p:spPr>
         <p:txBody>
@@ -2290,39 +2292,39 @@
           <a:lstStyle>
             <a:lvl1pPr marL="0" indent="0">
               <a:buNone/>
-              <a:defRPr sz="1600"/>
+              <a:defRPr sz="840"/>
             </a:lvl1pPr>
-            <a:lvl2pPr marL="457200" indent="0">
-              <a:buNone/>
-              <a:defRPr sz="1400"/>
+            <a:lvl2pPr marL="240030" indent="0">
+              <a:buNone/>
+              <a:defRPr sz="735"/>
             </a:lvl2pPr>
-            <a:lvl3pPr marL="914400" indent="0">
-              <a:buNone/>
-              <a:defRPr sz="1200"/>
+            <a:lvl3pPr marL="480060" indent="0">
+              <a:buNone/>
+              <a:defRPr sz="630"/>
             </a:lvl3pPr>
-            <a:lvl4pPr marL="1371600" indent="0">
-              <a:buNone/>
-              <a:defRPr sz="1000"/>
+            <a:lvl4pPr marL="720090" indent="0">
+              <a:buNone/>
+              <a:defRPr sz="525"/>
             </a:lvl4pPr>
-            <a:lvl5pPr marL="1828800" indent="0">
-              <a:buNone/>
-              <a:defRPr sz="1000"/>
+            <a:lvl5pPr marL="960120" indent="0">
+              <a:buNone/>
+              <a:defRPr sz="525"/>
             </a:lvl5pPr>
-            <a:lvl6pPr marL="2286000" indent="0">
-              <a:buNone/>
-              <a:defRPr sz="1000"/>
+            <a:lvl6pPr marL="1200150" indent="0">
+              <a:buNone/>
+              <a:defRPr sz="525"/>
             </a:lvl6pPr>
-            <a:lvl7pPr marL="2743200" indent="0">
-              <a:buNone/>
-              <a:defRPr sz="1000"/>
+            <a:lvl7pPr marL="1440180" indent="0">
+              <a:buNone/>
+              <a:defRPr sz="525"/>
             </a:lvl7pPr>
-            <a:lvl8pPr marL="3200400" indent="0">
-              <a:buNone/>
-              <a:defRPr sz="1000"/>
+            <a:lvl8pPr marL="1680210" indent="0">
+              <a:buNone/>
+              <a:defRPr sz="525"/>
             </a:lvl8pPr>
-            <a:lvl9pPr marL="3657600" indent="0">
-              <a:buNone/>
-              <a:defRPr sz="1000"/>
+            <a:lvl9pPr marL="1920240" indent="0">
+              <a:buNone/>
+              <a:defRPr sz="525"/>
             </a:lvl9pPr>
           </a:lstStyle>
           <a:p>
@@ -2336,7 +2338,7 @@
       </p:sp>
       <p:sp>
         <p:nvSpPr>
-          <p:cNvPr id="5" name="Symbol zastępczy daty 4"/>
+          <p:cNvPr id="5" name="Date Placeholder 4"/>
           <p:cNvSpPr>
             <a:spLocks noGrp="1"/>
           </p:cNvSpPr>
@@ -2351,7 +2353,7 @@
           <a:p>
             <a:fld id="{430D1825-ADB5-4B23-B937-FDEB78A4A206}" type="datetimeFigureOut">
               <a:rPr lang="pl-PL" smtClean="0"/>
-              <a:t>31.07.2018</a:t>
+              <a:t>01.08.2018</a:t>
             </a:fld>
             <a:endParaRPr lang="pl-PL"/>
           </a:p>
@@ -2359,7 +2361,7 @@
       </p:sp>
       <p:sp>
         <p:nvSpPr>
-          <p:cNvPr id="6" name="Symbol zastępczy stopki 5"/>
+          <p:cNvPr id="6" name="Footer Placeholder 5"/>
           <p:cNvSpPr>
             <a:spLocks noGrp="1"/>
           </p:cNvSpPr>
@@ -2378,7 +2380,7 @@
       </p:sp>
       <p:sp>
         <p:nvSpPr>
-          <p:cNvPr id="7" name="Symbol zastępczy numeru slajdu 6"/>
+          <p:cNvPr id="7" name="Slide Number Placeholder 6"/>
           <p:cNvSpPr>
             <a:spLocks noGrp="1"/>
           </p:cNvSpPr>
@@ -2402,7 +2404,7 @@
     </p:spTree>
     <p:extLst>
       <p:ext uri="{BB962C8B-B14F-4D97-AF65-F5344CB8AC3E}">
-        <p14:creationId xmlns:p14="http://schemas.microsoft.com/office/powerpoint/2010/main" val="3800389400"/>
+        <p14:creationId xmlns:p14="http://schemas.microsoft.com/office/powerpoint/2010/main" val="2893556160"/>
       </p:ext>
     </p:extLst>
   </p:cSld>
@@ -2436,7 +2438,7 @@
       </p:grpSpPr>
       <p:sp>
         <p:nvSpPr>
-          <p:cNvPr id="2" name="Symbol zastępczy tytułu 1"/>
+          <p:cNvPr id="2" name="Title Placeholder 1"/>
           <p:cNvSpPr>
             <a:spLocks noGrp="1"/>
           </p:cNvSpPr>
@@ -2446,8 +2448,8 @@
         </p:nvSpPr>
         <p:spPr>
           <a:xfrm>
-            <a:off x="838200" y="365125"/>
-            <a:ext cx="10515600" cy="1325563"/>
+            <a:off x="381119" y="191691"/>
+            <a:ext cx="4781312" cy="695921"/>
           </a:xfrm>
           <a:prstGeom prst="rect">
             <a:avLst/>
@@ -2463,13 +2465,13 @@
               <a:rPr lang="pl-PL" smtClean="0"/>
               <a:t>Kliknij, aby edytować styl</a:t>
             </a:r>
-            <a:endParaRPr lang="pl-PL"/>
-          </a:p>
-        </p:txBody>
-      </p:sp>
-      <p:sp>
-        <p:nvSpPr>
-          <p:cNvPr id="3" name="Symbol zastępczy tekstu 2"/>
+            <a:endParaRPr lang="en-US" dirty="0"/>
+          </a:p>
+        </p:txBody>
+      </p:sp>
+      <p:sp>
+        <p:nvSpPr>
+          <p:cNvPr id="3" name="Text Placeholder 2"/>
           <p:cNvSpPr>
             <a:spLocks noGrp="1"/>
           </p:cNvSpPr>
@@ -2479,8 +2481,8 @@
         </p:nvSpPr>
         <p:spPr>
           <a:xfrm>
-            <a:off x="838200" y="1825625"/>
-            <a:ext cx="10515600" cy="4351338"/>
+            <a:off x="381119" y="958453"/>
+            <a:ext cx="4781312" cy="2284452"/>
           </a:xfrm>
           <a:prstGeom prst="rect">
             <a:avLst/>
@@ -2525,13 +2527,13 @@
               <a:rPr lang="pl-PL" smtClean="0"/>
               <a:t>Piąty poziom</a:t>
             </a:r>
-            <a:endParaRPr lang="pl-PL"/>
-          </a:p>
-        </p:txBody>
-      </p:sp>
-      <p:sp>
-        <p:nvSpPr>
-          <p:cNvPr id="4" name="Symbol zastępczy daty 3"/>
+            <a:endParaRPr lang="en-US" dirty="0"/>
+          </a:p>
+        </p:txBody>
+      </p:sp>
+      <p:sp>
+        <p:nvSpPr>
+          <p:cNvPr id="4" name="Date Placeholder 3"/>
           <p:cNvSpPr>
             <a:spLocks noGrp="1"/>
           </p:cNvSpPr>
@@ -2541,8 +2543,8 @@
         </p:nvSpPr>
         <p:spPr>
           <a:xfrm>
-            <a:off x="838200" y="6356350"/>
-            <a:ext cx="2743200" cy="365125"/>
+            <a:off x="381119" y="3337084"/>
+            <a:ext cx="1247299" cy="191691"/>
           </a:xfrm>
           <a:prstGeom prst="rect">
             <a:avLst/>
@@ -2552,7 +2554,7 @@
           <a:bodyPr vert="horz" lIns="91440" tIns="45720" rIns="91440" bIns="45720" rtlCol="0" anchor="ctr"/>
           <a:lstStyle>
             <a:lvl1pPr algn="l">
-              <a:defRPr sz="1200">
+              <a:defRPr sz="630">
                 <a:solidFill>
                   <a:schemeClr val="tx1">
                     <a:tint val="75000"/>
@@ -2564,7 +2566,7 @@
           <a:p>
             <a:fld id="{430D1825-ADB5-4B23-B937-FDEB78A4A206}" type="datetimeFigureOut">
               <a:rPr lang="pl-PL" smtClean="0"/>
-              <a:t>31.07.2018</a:t>
+              <a:t>01.08.2018</a:t>
             </a:fld>
             <a:endParaRPr lang="pl-PL"/>
           </a:p>
@@ -2572,7 +2574,7 @@
       </p:sp>
       <p:sp>
         <p:nvSpPr>
-          <p:cNvPr id="5" name="Symbol zastępczy stopki 4"/>
+          <p:cNvPr id="5" name="Footer Placeholder 4"/>
           <p:cNvSpPr>
             <a:spLocks noGrp="1"/>
           </p:cNvSpPr>
@@ -2582,8 +2584,8 @@
         </p:nvSpPr>
         <p:spPr>
           <a:xfrm>
-            <a:off x="4038600" y="6356350"/>
-            <a:ext cx="4114800" cy="365125"/>
+            <a:off x="1836301" y="3337084"/>
+            <a:ext cx="1870948" cy="191691"/>
           </a:xfrm>
           <a:prstGeom prst="rect">
             <a:avLst/>
@@ -2593,7 +2595,7 @@
           <a:bodyPr vert="horz" lIns="91440" tIns="45720" rIns="91440" bIns="45720" rtlCol="0" anchor="ctr"/>
           <a:lstStyle>
             <a:lvl1pPr algn="ctr">
-              <a:defRPr sz="1200">
+              <a:defRPr sz="630">
                 <a:solidFill>
                   <a:schemeClr val="tx1">
                     <a:tint val="75000"/>
@@ -2609,7 +2611,7 @@
       </p:sp>
       <p:sp>
         <p:nvSpPr>
-          <p:cNvPr id="6" name="Symbol zastępczy numeru slajdu 5"/>
+          <p:cNvPr id="6" name="Slide Number Placeholder 5"/>
           <p:cNvSpPr>
             <a:spLocks noGrp="1"/>
           </p:cNvSpPr>
@@ -2619,8 +2621,8 @@
         </p:nvSpPr>
         <p:spPr>
           <a:xfrm>
-            <a:off x="8610600" y="6356350"/>
-            <a:ext cx="2743200" cy="365125"/>
+            <a:off x="3915132" y="3337084"/>
+            <a:ext cx="1247299" cy="191691"/>
           </a:xfrm>
           <a:prstGeom prst="rect">
             <a:avLst/>
@@ -2630,7 +2632,7 @@
           <a:bodyPr vert="horz" lIns="91440" tIns="45720" rIns="91440" bIns="45720" rtlCol="0" anchor="ctr"/>
           <a:lstStyle>
             <a:lvl1pPr algn="r">
-              <a:defRPr sz="1200">
+              <a:defRPr sz="630">
                 <a:solidFill>
                   <a:schemeClr val="tx1">
                     <a:tint val="75000"/>
@@ -2651,27 +2653,27 @@
     </p:spTree>
     <p:extLst>
       <p:ext uri="{BB962C8B-B14F-4D97-AF65-F5344CB8AC3E}">
-        <p14:creationId xmlns:p14="http://schemas.microsoft.com/office/powerpoint/2010/main" val="2843795249"/>
+        <p14:creationId xmlns:p14="http://schemas.microsoft.com/office/powerpoint/2010/main" val="1763550900"/>
       </p:ext>
     </p:extLst>
   </p:cSld>
   <p:clrMap bg1="lt1" tx1="dk1" bg2="lt2" tx2="dk2" accent1="accent1" accent2="accent2" accent3="accent3" accent4="accent4" accent5="accent5" accent6="accent6" hlink="hlink" folHlink="folHlink"/>
   <p:sldLayoutIdLst>
-    <p:sldLayoutId id="2147483649" r:id="rId1"/>
-    <p:sldLayoutId id="2147483650" r:id="rId2"/>
-    <p:sldLayoutId id="2147483651" r:id="rId3"/>
-    <p:sldLayoutId id="2147483652" r:id="rId4"/>
-    <p:sldLayoutId id="2147483653" r:id="rId5"/>
-    <p:sldLayoutId id="2147483654" r:id="rId6"/>
-    <p:sldLayoutId id="2147483655" r:id="rId7"/>
-    <p:sldLayoutId id="2147483656" r:id="rId8"/>
-    <p:sldLayoutId id="2147483657" r:id="rId9"/>
-    <p:sldLayoutId id="2147483658" r:id="rId10"/>
-    <p:sldLayoutId id="2147483659" r:id="rId11"/>
+    <p:sldLayoutId id="2147483685" r:id="rId1"/>
+    <p:sldLayoutId id="2147483686" r:id="rId2"/>
+    <p:sldLayoutId id="2147483687" r:id="rId3"/>
+    <p:sldLayoutId id="2147483688" r:id="rId4"/>
+    <p:sldLayoutId id="2147483689" r:id="rId5"/>
+    <p:sldLayoutId id="2147483690" r:id="rId6"/>
+    <p:sldLayoutId id="2147483691" r:id="rId7"/>
+    <p:sldLayoutId id="2147483692" r:id="rId8"/>
+    <p:sldLayoutId id="2147483693" r:id="rId9"/>
+    <p:sldLayoutId id="2147483694" r:id="rId10"/>
+    <p:sldLayoutId id="2147483695" r:id="rId11"/>
   </p:sldLayoutIdLst>
   <p:txStyles>
     <p:titleStyle>
-      <a:lvl1pPr algn="l" defTabSz="914400" rtl="0" eaLnBrk="1" latinLnBrk="0" hangingPunct="1">
+      <a:lvl1pPr algn="l" defTabSz="480060" rtl="0" eaLnBrk="1" latinLnBrk="0" hangingPunct="1">
         <a:lnSpc>
           <a:spcPct val="90000"/>
         </a:lnSpc>
@@ -2679,7 +2681,7 @@
           <a:spcPct val="0"/>
         </a:spcBef>
         <a:buNone/>
-        <a:defRPr sz="4400" kern="1200">
+        <a:defRPr sz="2310" kern="1200">
           <a:solidFill>
             <a:schemeClr val="tx1"/>
           </a:solidFill>
@@ -2690,16 +2692,16 @@
       </a:lvl1pPr>
     </p:titleStyle>
     <p:bodyStyle>
-      <a:lvl1pPr marL="228600" indent="-228600" algn="l" defTabSz="914400" rtl="0" eaLnBrk="1" latinLnBrk="0" hangingPunct="1">
+      <a:lvl1pPr marL="120015" indent="-120015" algn="l" defTabSz="480060" rtl="0" eaLnBrk="1" latinLnBrk="0" hangingPunct="1">
         <a:lnSpc>
           <a:spcPct val="90000"/>
         </a:lnSpc>
         <a:spcBef>
-          <a:spcPts val="1000"/>
+          <a:spcPts val="525"/>
         </a:spcBef>
         <a:buFont typeface="Arial" panose="020B0604020202020204" pitchFamily="34" charset="0"/>
         <a:buChar char="•"/>
-        <a:defRPr sz="2800" kern="1200">
+        <a:defRPr sz="1470" kern="1200">
           <a:solidFill>
             <a:schemeClr val="tx1"/>
           </a:solidFill>
@@ -2708,16 +2710,16 @@
           <a:cs typeface="+mn-cs"/>
         </a:defRPr>
       </a:lvl1pPr>
-      <a:lvl2pPr marL="685800" indent="-228600" algn="l" defTabSz="914400" rtl="0" eaLnBrk="1" latinLnBrk="0" hangingPunct="1">
+      <a:lvl2pPr marL="360045" indent="-120015" algn="l" defTabSz="480060" rtl="0" eaLnBrk="1" latinLnBrk="0" hangingPunct="1">
         <a:lnSpc>
           <a:spcPct val="90000"/>
         </a:lnSpc>
         <a:spcBef>
-          <a:spcPts val="500"/>
+          <a:spcPts val="263"/>
         </a:spcBef>
         <a:buFont typeface="Arial" panose="020B0604020202020204" pitchFamily="34" charset="0"/>
         <a:buChar char="•"/>
-        <a:defRPr sz="2400" kern="1200">
+        <a:defRPr sz="1260" kern="1200">
           <a:solidFill>
             <a:schemeClr val="tx1"/>
           </a:solidFill>
@@ -2726,16 +2728,16 @@
           <a:cs typeface="+mn-cs"/>
         </a:defRPr>
       </a:lvl2pPr>
-      <a:lvl3pPr marL="1143000" indent="-228600" algn="l" defTabSz="914400" rtl="0" eaLnBrk="1" latinLnBrk="0" hangingPunct="1">
+      <a:lvl3pPr marL="600075" indent="-120015" algn="l" defTabSz="480060" rtl="0" eaLnBrk="1" latinLnBrk="0" hangingPunct="1">
         <a:lnSpc>
           <a:spcPct val="90000"/>
         </a:lnSpc>
         <a:spcBef>
-          <a:spcPts val="500"/>
+          <a:spcPts val="263"/>
         </a:spcBef>
         <a:buFont typeface="Arial" panose="020B0604020202020204" pitchFamily="34" charset="0"/>
         <a:buChar char="•"/>
-        <a:defRPr sz="2000" kern="1200">
+        <a:defRPr sz="1050" kern="1200">
           <a:solidFill>
             <a:schemeClr val="tx1"/>
           </a:solidFill>
@@ -2744,16 +2746,16 @@
           <a:cs typeface="+mn-cs"/>
         </a:defRPr>
       </a:lvl3pPr>
-      <a:lvl4pPr marL="1600200" indent="-228600" algn="l" defTabSz="914400" rtl="0" eaLnBrk="1" latinLnBrk="0" hangingPunct="1">
+      <a:lvl4pPr marL="840105" indent="-120015" algn="l" defTabSz="480060" rtl="0" eaLnBrk="1" latinLnBrk="0" hangingPunct="1">
         <a:lnSpc>
           <a:spcPct val="90000"/>
         </a:lnSpc>
         <a:spcBef>
-          <a:spcPts val="500"/>
+          <a:spcPts val="263"/>
         </a:spcBef>
         <a:buFont typeface="Arial" panose="020B0604020202020204" pitchFamily="34" charset="0"/>
         <a:buChar char="•"/>
-        <a:defRPr sz="1800" kern="1200">
+        <a:defRPr sz="945" kern="1200">
           <a:solidFill>
             <a:schemeClr val="tx1"/>
           </a:solidFill>
@@ -2762,16 +2764,16 @@
           <a:cs typeface="+mn-cs"/>
         </a:defRPr>
       </a:lvl4pPr>
-      <a:lvl5pPr marL="2057400" indent="-228600" algn="l" defTabSz="914400" rtl="0" eaLnBrk="1" latinLnBrk="0" hangingPunct="1">
+      <a:lvl5pPr marL="1080135" indent="-120015" algn="l" defTabSz="480060" rtl="0" eaLnBrk="1" latinLnBrk="0" hangingPunct="1">
         <a:lnSpc>
           <a:spcPct val="90000"/>
         </a:lnSpc>
         <a:spcBef>
-          <a:spcPts val="500"/>
+          <a:spcPts val="263"/>
         </a:spcBef>
         <a:buFont typeface="Arial" panose="020B0604020202020204" pitchFamily="34" charset="0"/>
         <a:buChar char="•"/>
-        <a:defRPr sz="1800" kern="1200">
+        <a:defRPr sz="945" kern="1200">
           <a:solidFill>
             <a:schemeClr val="tx1"/>
           </a:solidFill>
@@ -2780,16 +2782,16 @@
           <a:cs typeface="+mn-cs"/>
         </a:defRPr>
       </a:lvl5pPr>
-      <a:lvl6pPr marL="2514600" indent="-228600" algn="l" defTabSz="914400" rtl="0" eaLnBrk="1" latinLnBrk="0" hangingPunct="1">
+      <a:lvl6pPr marL="1320165" indent="-120015" algn="l" defTabSz="480060" rtl="0" eaLnBrk="1" latinLnBrk="0" hangingPunct="1">
         <a:lnSpc>
           <a:spcPct val="90000"/>
         </a:lnSpc>
         <a:spcBef>
-          <a:spcPts val="500"/>
+          <a:spcPts val="263"/>
         </a:spcBef>
         <a:buFont typeface="Arial" panose="020B0604020202020204" pitchFamily="34" charset="0"/>
         <a:buChar char="•"/>
-        <a:defRPr sz="1800" kern="1200">
+        <a:defRPr sz="945" kern="1200">
           <a:solidFill>
             <a:schemeClr val="tx1"/>
           </a:solidFill>
@@ -2798,16 +2800,16 @@
           <a:cs typeface="+mn-cs"/>
         </a:defRPr>
       </a:lvl6pPr>
-      <a:lvl7pPr marL="2971800" indent="-228600" algn="l" defTabSz="914400" rtl="0" eaLnBrk="1" latinLnBrk="0" hangingPunct="1">
+      <a:lvl7pPr marL="1560195" indent="-120015" algn="l" defTabSz="480060" rtl="0" eaLnBrk="1" latinLnBrk="0" hangingPunct="1">
         <a:lnSpc>
           <a:spcPct val="90000"/>
         </a:lnSpc>
         <a:spcBef>
-          <a:spcPts val="500"/>
+          <a:spcPts val="263"/>
         </a:spcBef>
         <a:buFont typeface="Arial" panose="020B0604020202020204" pitchFamily="34" charset="0"/>
         <a:buChar char="•"/>
-        <a:defRPr sz="1800" kern="1200">
+        <a:defRPr sz="945" kern="1200">
           <a:solidFill>
             <a:schemeClr val="tx1"/>
           </a:solidFill>
@@ -2816,16 +2818,16 @@
           <a:cs typeface="+mn-cs"/>
         </a:defRPr>
       </a:lvl7pPr>
-      <a:lvl8pPr marL="3429000" indent="-228600" algn="l" defTabSz="914400" rtl="0" eaLnBrk="1" latinLnBrk="0" hangingPunct="1">
+      <a:lvl8pPr marL="1800225" indent="-120015" algn="l" defTabSz="480060" rtl="0" eaLnBrk="1" latinLnBrk="0" hangingPunct="1">
         <a:lnSpc>
           <a:spcPct val="90000"/>
         </a:lnSpc>
         <a:spcBef>
-          <a:spcPts val="500"/>
+          <a:spcPts val="263"/>
         </a:spcBef>
         <a:buFont typeface="Arial" panose="020B0604020202020204" pitchFamily="34" charset="0"/>
         <a:buChar char="•"/>
-        <a:defRPr sz="1800" kern="1200">
+        <a:defRPr sz="945" kern="1200">
           <a:solidFill>
             <a:schemeClr val="tx1"/>
           </a:solidFill>
@@ -2834,16 +2836,16 @@
           <a:cs typeface="+mn-cs"/>
         </a:defRPr>
       </a:lvl8pPr>
-      <a:lvl9pPr marL="3886200" indent="-228600" algn="l" defTabSz="914400" rtl="0" eaLnBrk="1" latinLnBrk="0" hangingPunct="1">
+      <a:lvl9pPr marL="2040255" indent="-120015" algn="l" defTabSz="480060" rtl="0" eaLnBrk="1" latinLnBrk="0" hangingPunct="1">
         <a:lnSpc>
           <a:spcPct val="90000"/>
         </a:lnSpc>
         <a:spcBef>
-          <a:spcPts val="500"/>
+          <a:spcPts val="263"/>
         </a:spcBef>
         <a:buFont typeface="Arial" panose="020B0604020202020204" pitchFamily="34" charset="0"/>
         <a:buChar char="•"/>
-        <a:defRPr sz="1800" kern="1200">
+        <a:defRPr sz="945" kern="1200">
           <a:solidFill>
             <a:schemeClr val="tx1"/>
           </a:solidFill>
@@ -2855,10 +2857,10 @@
     </p:bodyStyle>
     <p:otherStyle>
       <a:defPPr>
-        <a:defRPr lang="pl-PL"/>
+        <a:defRPr lang="en-US"/>
       </a:defPPr>
-      <a:lvl1pPr marL="0" algn="l" defTabSz="914400" rtl="0" eaLnBrk="1" latinLnBrk="0" hangingPunct="1">
-        <a:defRPr sz="1800" kern="1200">
+      <a:lvl1pPr marL="0" algn="l" defTabSz="480060" rtl="0" eaLnBrk="1" latinLnBrk="0" hangingPunct="1">
+        <a:defRPr sz="945" kern="1200">
           <a:solidFill>
             <a:schemeClr val="tx1"/>
           </a:solidFill>
@@ -2867,8 +2869,8 @@
           <a:cs typeface="+mn-cs"/>
         </a:defRPr>
       </a:lvl1pPr>
-      <a:lvl2pPr marL="457200" algn="l" defTabSz="914400" rtl="0" eaLnBrk="1" latinLnBrk="0" hangingPunct="1">
-        <a:defRPr sz="1800" kern="1200">
+      <a:lvl2pPr marL="240030" algn="l" defTabSz="480060" rtl="0" eaLnBrk="1" latinLnBrk="0" hangingPunct="1">
+        <a:defRPr sz="945" kern="1200">
           <a:solidFill>
             <a:schemeClr val="tx1"/>
           </a:solidFill>
@@ -2877,8 +2879,8 @@
           <a:cs typeface="+mn-cs"/>
         </a:defRPr>
       </a:lvl2pPr>
-      <a:lvl3pPr marL="914400" algn="l" defTabSz="914400" rtl="0" eaLnBrk="1" latinLnBrk="0" hangingPunct="1">
-        <a:defRPr sz="1800" kern="1200">
+      <a:lvl3pPr marL="480060" algn="l" defTabSz="480060" rtl="0" eaLnBrk="1" latinLnBrk="0" hangingPunct="1">
+        <a:defRPr sz="945" kern="1200">
           <a:solidFill>
             <a:schemeClr val="tx1"/>
           </a:solidFill>
@@ -2887,8 +2889,8 @@
           <a:cs typeface="+mn-cs"/>
         </a:defRPr>
       </a:lvl3pPr>
-      <a:lvl4pPr marL="1371600" algn="l" defTabSz="914400" rtl="0" eaLnBrk="1" latinLnBrk="0" hangingPunct="1">
-        <a:defRPr sz="1800" kern="1200">
+      <a:lvl4pPr marL="720090" algn="l" defTabSz="480060" rtl="0" eaLnBrk="1" latinLnBrk="0" hangingPunct="1">
+        <a:defRPr sz="945" kern="1200">
           <a:solidFill>
             <a:schemeClr val="tx1"/>
           </a:solidFill>
@@ -2897,8 +2899,8 @@
           <a:cs typeface="+mn-cs"/>
         </a:defRPr>
       </a:lvl4pPr>
-      <a:lvl5pPr marL="1828800" algn="l" defTabSz="914400" rtl="0" eaLnBrk="1" latinLnBrk="0" hangingPunct="1">
-        <a:defRPr sz="1800" kern="1200">
+      <a:lvl5pPr marL="960120" algn="l" defTabSz="480060" rtl="0" eaLnBrk="1" latinLnBrk="0" hangingPunct="1">
+        <a:defRPr sz="945" kern="1200">
           <a:solidFill>
             <a:schemeClr val="tx1"/>
           </a:solidFill>
@@ -2907,8 +2909,8 @@
           <a:cs typeface="+mn-cs"/>
         </a:defRPr>
       </a:lvl5pPr>
-      <a:lvl6pPr marL="2286000" algn="l" defTabSz="914400" rtl="0" eaLnBrk="1" latinLnBrk="0" hangingPunct="1">
-        <a:defRPr sz="1800" kern="1200">
+      <a:lvl6pPr marL="1200150" algn="l" defTabSz="480060" rtl="0" eaLnBrk="1" latinLnBrk="0" hangingPunct="1">
+        <a:defRPr sz="945" kern="1200">
           <a:solidFill>
             <a:schemeClr val="tx1"/>
           </a:solidFill>
@@ -2917,8 +2919,8 @@
           <a:cs typeface="+mn-cs"/>
         </a:defRPr>
       </a:lvl6pPr>
-      <a:lvl7pPr marL="2743200" algn="l" defTabSz="914400" rtl="0" eaLnBrk="1" latinLnBrk="0" hangingPunct="1">
-        <a:defRPr sz="1800" kern="1200">
+      <a:lvl7pPr marL="1440180" algn="l" defTabSz="480060" rtl="0" eaLnBrk="1" latinLnBrk="0" hangingPunct="1">
+        <a:defRPr sz="945" kern="1200">
           <a:solidFill>
             <a:schemeClr val="tx1"/>
           </a:solidFill>
@@ -2927,8 +2929,8 @@
           <a:cs typeface="+mn-cs"/>
         </a:defRPr>
       </a:lvl7pPr>
-      <a:lvl8pPr marL="3200400" algn="l" defTabSz="914400" rtl="0" eaLnBrk="1" latinLnBrk="0" hangingPunct="1">
-        <a:defRPr sz="1800" kern="1200">
+      <a:lvl8pPr marL="1680210" algn="l" defTabSz="480060" rtl="0" eaLnBrk="1" latinLnBrk="0" hangingPunct="1">
+        <a:defRPr sz="945" kern="1200">
           <a:solidFill>
             <a:schemeClr val="tx1"/>
           </a:solidFill>
@@ -2937,8 +2939,8 @@
           <a:cs typeface="+mn-cs"/>
         </a:defRPr>
       </a:lvl8pPr>
-      <a:lvl9pPr marL="3657600" algn="l" defTabSz="914400" rtl="0" eaLnBrk="1" latinLnBrk="0" hangingPunct="1">
-        <a:defRPr sz="1800" kern="1200">
+      <a:lvl9pPr marL="1920240" algn="l" defTabSz="480060" rtl="0" eaLnBrk="1" latinLnBrk="0" hangingPunct="1">
+        <a:defRPr sz="945" kern="1200">
           <a:solidFill>
             <a:schemeClr val="tx1"/>
           </a:solidFill>
@@ -2977,8 +2979,8 @@
         </p:nvSpPr>
         <p:spPr>
           <a:xfrm>
-            <a:off x="5410199" y="821033"/>
-            <a:ext cx="1800583" cy="584775"/>
+            <a:off x="1738312" y="709294"/>
+            <a:ext cx="1462974" cy="488574"/>
           </a:xfrm>
           <a:prstGeom prst="roundRect">
             <a:avLst/>
@@ -3011,7 +3013,7 @@
           <a:lstStyle/>
           <a:p>
             <a:pPr algn="ctr"/>
-            <a:endParaRPr lang="pl-PL"/>
+            <a:endParaRPr lang="pl-PL" sz="1463"/>
           </a:p>
         </p:txBody>
       </p:sp>
@@ -3023,30 +3025,48 @@
         </p:nvSpPr>
         <p:spPr>
           <a:xfrm>
-            <a:off x="3106339" y="2687637"/>
-            <a:ext cx="612000" cy="612000"/>
+            <a:off x="761775" y="1912243"/>
+            <a:ext cx="497250" cy="497250"/>
           </a:xfrm>
           <a:prstGeom prst="roundRect">
             <a:avLst/>
           </a:prstGeom>
-          <a:solidFill>
-            <a:srgbClr val="E0E0E0"/>
-          </a:solidFill>
+          <a:gradFill flip="none" rotWithShape="1">
+            <a:gsLst>
+              <a:gs pos="0">
+                <a:schemeClr val="dk1">
+                  <a:lumMod val="67000"/>
+                </a:schemeClr>
+              </a:gs>
+              <a:gs pos="48000">
+                <a:schemeClr val="dk1">
+                  <a:lumMod val="97000"/>
+                  <a:lumOff val="3000"/>
+                </a:schemeClr>
+              </a:gs>
+              <a:gs pos="100000">
+                <a:schemeClr val="dk1">
+                  <a:lumMod val="60000"/>
+                  <a:lumOff val="40000"/>
+                </a:schemeClr>
+              </a:gs>
+            </a:gsLst>
+            <a:lin ang="16200000" scaled="1"/>
+            <a:tileRect/>
+          </a:gradFill>
           <a:ln>
             <a:noFill/>
           </a:ln>
         </p:spPr>
         <p:style>
-          <a:lnRef idx="2">
-            <a:schemeClr val="accent1">
-              <a:shade val="50000"/>
-            </a:schemeClr>
+          <a:lnRef idx="0">
+            <a:scrgbClr r="0" g="0" b="0"/>
           </a:lnRef>
-          <a:fillRef idx="1">
-            <a:schemeClr val="accent1"/>
+          <a:fillRef idx="0">
+            <a:scrgbClr r="0" g="0" b="0"/>
           </a:fillRef>
           <a:effectRef idx="0">
-            <a:schemeClr val="accent1"/>
+            <a:scrgbClr r="0" g="0" b="0"/>
           </a:effectRef>
           <a:fontRef idx="minor">
             <a:schemeClr val="lt1"/>
@@ -3057,7 +3077,7 @@
           <a:lstStyle/>
           <a:p>
             <a:pPr algn="ctr"/>
-            <a:endParaRPr lang="pl-PL"/>
+            <a:endParaRPr lang="pl-PL" sz="1463"/>
           </a:p>
         </p:txBody>
       </p:sp>
@@ -3069,8 +3089,8 @@
         </p:nvSpPr>
         <p:spPr>
           <a:xfrm>
-            <a:off x="3200401" y="2786063"/>
-            <a:ext cx="421481" cy="423862"/>
+            <a:off x="838203" y="1992214"/>
+            <a:ext cx="342453" cy="344388"/>
           </a:xfrm>
           <a:prstGeom prst="arc">
             <a:avLst>
@@ -3103,7 +3123,7 @@
           <a:lstStyle/>
           <a:p>
             <a:pPr algn="ctr"/>
-            <a:endParaRPr lang="pl-PL"/>
+            <a:endParaRPr lang="pl-PL" sz="1463"/>
           </a:p>
         </p:txBody>
       </p:sp>
@@ -3115,8 +3135,8 @@
         </p:nvSpPr>
         <p:spPr>
           <a:xfrm>
-            <a:off x="3496983" y="2785970"/>
-            <a:ext cx="128349" cy="138303"/>
+            <a:off x="1079174" y="1992141"/>
+            <a:ext cx="104284" cy="112371"/>
           </a:xfrm>
           <a:prstGeom prst="rtTriangle">
             <a:avLst/>
@@ -3149,7 +3169,7 @@
           <a:lstStyle/>
           <a:p>
             <a:pPr algn="ctr"/>
-            <a:endParaRPr lang="pl-PL"/>
+            <a:endParaRPr lang="pl-PL" sz="1463"/>
           </a:p>
         </p:txBody>
       </p:sp>
@@ -3161,8 +3181,8 @@
         </p:nvSpPr>
         <p:spPr>
           <a:xfrm>
-            <a:off x="3332544" y="2902743"/>
-            <a:ext cx="161954" cy="171450"/>
+            <a:off x="945567" y="2087018"/>
+            <a:ext cx="131588" cy="139303"/>
           </a:xfrm>
           <a:prstGeom prst="downArrow">
             <a:avLst/>
@@ -3195,7 +3215,7 @@
           <a:lstStyle/>
           <a:p>
             <a:pPr algn="ctr"/>
-            <a:endParaRPr lang="pl-PL"/>
+            <a:endParaRPr lang="pl-PL" sz="1463"/>
           </a:p>
         </p:txBody>
       </p:sp>
@@ -3207,8 +3227,8 @@
         </p:nvSpPr>
         <p:spPr>
           <a:xfrm>
-            <a:off x="3320774" y="3076679"/>
-            <a:ext cx="180734" cy="31227"/>
+            <a:off x="936004" y="2228340"/>
+            <a:ext cx="146846" cy="25372"/>
           </a:xfrm>
           <a:prstGeom prst="rect">
             <a:avLst/>
@@ -3241,7 +3261,7 @@
           <a:lstStyle/>
           <a:p>
             <a:pPr algn="ctr"/>
-            <a:endParaRPr lang="pl-PL"/>
+            <a:endParaRPr lang="pl-PL" sz="1463"/>
           </a:p>
         </p:txBody>
       </p:sp>
@@ -3253,8 +3273,8 @@
         </p:nvSpPr>
         <p:spPr>
           <a:xfrm>
-            <a:off x="5521051" y="912019"/>
-            <a:ext cx="421481" cy="423862"/>
+            <a:off x="1828382" y="783220"/>
+            <a:ext cx="342453" cy="344388"/>
           </a:xfrm>
           <a:prstGeom prst="arc">
             <a:avLst>
@@ -3287,7 +3307,7 @@
           <a:lstStyle/>
           <a:p>
             <a:pPr algn="ctr"/>
-            <a:endParaRPr lang="pl-PL"/>
+            <a:endParaRPr lang="pl-PL" sz="1463"/>
           </a:p>
         </p:txBody>
       </p:sp>
@@ -3299,8 +3319,8 @@
         </p:nvSpPr>
         <p:spPr>
           <a:xfrm>
-            <a:off x="5817633" y="911926"/>
-            <a:ext cx="128349" cy="138303"/>
+            <a:off x="2069352" y="783146"/>
+            <a:ext cx="104284" cy="112371"/>
           </a:xfrm>
           <a:prstGeom prst="rtTriangle">
             <a:avLst/>
@@ -3333,7 +3353,7 @@
           <a:lstStyle/>
           <a:p>
             <a:pPr algn="ctr"/>
-            <a:endParaRPr lang="pl-PL"/>
+            <a:endParaRPr lang="pl-PL" sz="1463"/>
           </a:p>
         </p:txBody>
       </p:sp>
@@ -3345,8 +3365,8 @@
         </p:nvSpPr>
         <p:spPr>
           <a:xfrm>
-            <a:off x="5653194" y="1028699"/>
-            <a:ext cx="161954" cy="171450"/>
+            <a:off x="1935745" y="878024"/>
+            <a:ext cx="131588" cy="139303"/>
           </a:xfrm>
           <a:prstGeom prst="downArrow">
             <a:avLst/>
@@ -3379,7 +3399,7 @@
           <a:lstStyle/>
           <a:p>
             <a:pPr algn="ctr"/>
-            <a:endParaRPr lang="pl-PL"/>
+            <a:endParaRPr lang="pl-PL" sz="1463"/>
           </a:p>
         </p:txBody>
       </p:sp>
@@ -3391,8 +3411,8 @@
         </p:nvSpPr>
         <p:spPr>
           <a:xfrm>
-            <a:off x="5641424" y="1202635"/>
-            <a:ext cx="180734" cy="31227"/>
+            <a:off x="1926182" y="1019346"/>
+            <a:ext cx="146846" cy="25372"/>
           </a:xfrm>
           <a:prstGeom prst="rect">
             <a:avLst/>
@@ -3425,7 +3445,7 @@
           <a:lstStyle/>
           <a:p>
             <a:pPr algn="ctr"/>
-            <a:endParaRPr lang="pl-PL"/>
+            <a:endParaRPr lang="pl-PL" sz="1463"/>
           </a:p>
         </p:txBody>
       </p:sp>
@@ -3437,8 +3457,8 @@
         </p:nvSpPr>
         <p:spPr>
           <a:xfrm>
-            <a:off x="5974932" y="816270"/>
-            <a:ext cx="1235851" cy="584775"/>
+            <a:off x="2197157" y="705425"/>
+            <a:ext cx="1038746" cy="492443"/>
           </a:xfrm>
           <a:prstGeom prst="rect">
             <a:avLst/>
@@ -3452,7 +3472,7 @@
           <a:lstStyle/>
           <a:p>
             <a:r>
-              <a:rPr lang="pl-PL" sz="1600" b="1" dirty="0" smtClean="0">
+              <a:rPr lang="pl-PL" sz="1300" b="1" dirty="0">
                 <a:solidFill>
                   <a:srgbClr val="00B0F0"/>
                 </a:solidFill>
@@ -3460,25 +3480,20 @@
               <a:t>Freedisc</a:t>
             </a:r>
             <a:br>
-              <a:rPr lang="pl-PL" sz="1600" b="1" dirty="0" smtClean="0">
+              <a:rPr lang="pl-PL" sz="1300" b="1" dirty="0">
                 <a:solidFill>
                   <a:srgbClr val="00B0F0"/>
                 </a:solidFill>
               </a:rPr>
             </a:br>
             <a:r>
-              <a:rPr lang="pl-PL" sz="1600" b="1" dirty="0" smtClean="0">
+              <a:rPr lang="pl-PL" sz="1300" b="1" dirty="0">
                 <a:solidFill>
                   <a:srgbClr val="00B0F0"/>
                 </a:solidFill>
               </a:rPr>
               <a:t>Downloader</a:t>
             </a:r>
-            <a:endParaRPr lang="pl-PL" sz="1600" b="1" dirty="0">
-              <a:solidFill>
-                <a:srgbClr val="00B0F0"/>
-              </a:solidFill>
-            </a:endParaRPr>
           </a:p>
         </p:txBody>
       </p:sp>
@@ -3505,7 +3520,7 @@
 <file path=ppt/theme/theme1.xml><?xml version="1.0" encoding="utf-8"?>
 <a:theme xmlns:a="http://schemas.openxmlformats.org/drawingml/2006/main" name="Motyw pakietu Office">
   <a:themeElements>
-    <a:clrScheme name="Pakiet Office">
+    <a:clrScheme name="Motyw pakietu Office">
       <a:dk1>
         <a:sysClr val="windowText" lastClr="000000"/>
       </a:dk1>
@@ -3543,7 +3558,7 @@
         <a:srgbClr val="954F72"/>
       </a:folHlink>
     </a:clrScheme>
-    <a:fontScheme name="Pakiet Office">
+    <a:fontScheme name="Motyw pakietu Office">
       <a:majorFont>
         <a:latin typeface="Calibri Light" panose="020F0302020204030204"/>
         <a:ea typeface=""/>
@@ -3615,7 +3630,7 @@
         <a:font script="Geor" typeface="Sylfaen"/>
       </a:minorFont>
     </a:fontScheme>
-    <a:fmtScheme name="Pakiet Office">
+    <a:fmtScheme name="Motyw pakietu Office">
       <a:fillStyleLst>
         <a:solidFill>
           <a:schemeClr val="phClr"/>

</xml_diff>